<commit_message>
finished module and tests
</commit_message>
<xml_diff>
--- a/Pester Practically Perfect PowerShell.pptx
+++ b/Pester Practically Perfect PowerShell.pptx
@@ -7524,7 +7524,7 @@
           <a:p>
             <a:r>
               <a:rPr lang="en-US" dirty="0"/>
-              <a:t>More Pester Components</a:t>
+              <a:t>Testing a module?</a:t>
             </a:r>
           </a:p>
         </p:txBody>
@@ -7549,6 +7549,20 @@
               <a:t>InModuleScope</a:t>
             </a:r>
             <a:endParaRPr lang="en-US" dirty="0"/>
+          </a:p>
+          <a:p>
+            <a:pPr lvl="1"/>
+            <a:r>
+              <a:rPr lang="en-US" dirty="0"/>
+              <a:t>Allows testing of internal (non-exported) code of a script module.</a:t>
+            </a:r>
+          </a:p>
+          <a:p>
+            <a:pPr lvl="2"/>
+            <a:r>
+              <a:rPr lang="en-US" dirty="0"/>
+              <a:t>Functions, variables, aliases.</a:t>
+            </a:r>
           </a:p>
           <a:p>
             <a:pPr marL="0" indent="0">
@@ -18846,15 +18860,6 @@
 </file>
 
 <file path=customXml/item1.xml><?xml version="1.0" encoding="utf-8"?>
-<?mso-contentType ?>
-<FormTemplates xmlns="http://schemas.microsoft.com/sharepoint/v3/contenttype/forms">
-  <Display>DocumentLibraryForm</Display>
-  <Edit>DocumentLibraryForm</Edit>
-  <New>DocumentLibraryForm</New>
-</FormTemplates>
-</file>
-
-<file path=customXml/item2.xml><?xml version="1.0" encoding="utf-8"?>
 <ct:contentTypeSchema xmlns:ct="http://schemas.microsoft.com/office/2006/metadata/contentType" xmlns:ma="http://schemas.microsoft.com/office/2006/metadata/properties/metaAttributes" ct:_="" ma:_="" ma:contentTypeName="Document" ma:contentTypeID="0x010100CFD7474EC5F9804A8C0915A0D2B3E72B" ma:contentTypeVersion="6" ma:contentTypeDescription="Create a new document." ma:contentTypeScope="" ma:versionID="1e506071d132a47b68c5589909b09f0e">
   <xsd:schema xmlns:xsd="http://www.w3.org/2001/XMLSchema" xmlns:xs="http://www.w3.org/2001/XMLSchema" xmlns:p="http://schemas.microsoft.com/office/2006/metadata/properties" xmlns:ns2="437d3976-146d-487e-9b32-45ade7cdb3c3" xmlns:ns3="ba924082-f255-4689-bc14-7c311a17681c" targetNamespace="http://schemas.microsoft.com/office/2006/metadata/properties" ma:root="true" ma:fieldsID="d9451a99ae5dfcf301f63b02ef9f83d5" ns2:_="" ns3:_="">
     <xsd:import namespace="437d3976-146d-487e-9b32-45ade7cdb3c3"/>
@@ -19033,6 +19038,15 @@
 </ct:contentTypeSchema>
 </file>
 
+<file path=customXml/item2.xml><?xml version="1.0" encoding="utf-8"?>
+<?mso-contentType ?>
+<FormTemplates xmlns="http://schemas.microsoft.com/sharepoint/v3/contenttype/forms">
+  <Display>DocumentLibraryForm</Display>
+  <Edit>DocumentLibraryForm</Edit>
+  <New>DocumentLibraryForm</New>
+</FormTemplates>
+</file>
+
 <file path=customXml/item3.xml><?xml version="1.0" encoding="utf-8"?>
 <p:properties xmlns:p="http://schemas.microsoft.com/office/2006/metadata/properties" xmlns:xsi="http://www.w3.org/2001/XMLSchema-instance" xmlns:pc="http://schemas.microsoft.com/office/infopath/2007/PartnerControls">
   <documentManagement/>
@@ -19040,14 +19054,6 @@
 </file>
 
 <file path=customXml/itemProps1.xml><?xml version="1.0" encoding="utf-8"?>
-<ds:datastoreItem xmlns:ds="http://schemas.openxmlformats.org/officeDocument/2006/customXml" ds:itemID="{8F9099B0-B9E3-45A6-848D-7EA25626C078}">
-  <ds:schemaRefs>
-    <ds:schemaRef ds:uri="http://schemas.microsoft.com/sharepoint/v3/contenttype/forms"/>
-  </ds:schemaRefs>
-</ds:datastoreItem>
-</file>
-
-<file path=customXml/itemProps2.xml><?xml version="1.0" encoding="utf-8"?>
 <ds:datastoreItem xmlns:ds="http://schemas.openxmlformats.org/officeDocument/2006/customXml" ds:itemID="{1881FD18-C877-47D9-A9C8-9B9EB7A5D424}">
   <ds:schemaRefs>
     <ds:schemaRef ds:uri="http://schemas.microsoft.com/office/2006/metadata/contentType"/>
@@ -19062,6 +19068,14 @@
     <ds:schemaRef ds:uri="http://purl.org/dc/elements/1.1/"/>
     <ds:schemaRef ds:uri="http://purl.org/dc/terms/"/>
     <ds:schemaRef ds:uri="http://schemas.microsoft.com/internal/obd"/>
+  </ds:schemaRefs>
+</ds:datastoreItem>
+</file>
+
+<file path=customXml/itemProps2.xml><?xml version="1.0" encoding="utf-8"?>
+<ds:datastoreItem xmlns:ds="http://schemas.openxmlformats.org/officeDocument/2006/customXml" ds:itemID="{8F9099B0-B9E3-45A6-848D-7EA25626C078}">
+  <ds:schemaRefs>
+    <ds:schemaRef ds:uri="http://schemas.microsoft.com/sharepoint/v3/contenttype/forms"/>
   </ds:schemaRefs>
 </ds:datastoreItem>
 </file>

</xml_diff>

<commit_message>
starting work on .net methods
</commit_message>
<xml_diff>
--- a/Pester Practically Perfect PowerShell.pptx
+++ b/Pester Practically Perfect PowerShell.pptx
@@ -1734,7 +1734,15 @@
           <a:p>
             <a:r>
               <a:rPr lang="en-US" dirty="0"/>
-              <a:t>The majority of the tests we you are going to write are unit tests.</a:t>
+              <a:t>After running this through some list that are hundreds of thousands of items</a:t>
+            </a:r>
+            <a:r>
+              <a:rPr lang="en-US"/>
+              <a:t>, its time </a:t>
+            </a:r>
+            <a:r>
+              <a:rPr lang="en-US" dirty="0"/>
+              <a:t>to convert to an array list</a:t>
             </a:r>
           </a:p>
         </p:txBody>
@@ -1756,7 +1764,7 @@
           <a:p>
             <a:fld id="{C7B05CAA-7DFD-4456-A943-C499583EE113}" type="slidenum">
               <a:rPr lang="en-US" smtClean="0"/>
-              <a:t>26</a:t>
+              <a:t>25</a:t>
             </a:fld>
             <a:endParaRPr lang="en-US"/>
           </a:p>
@@ -1765,7 +1773,7 @@
     </p:spTree>
     <p:extLst>
       <p:ext uri="{BB962C8B-B14F-4D97-AF65-F5344CB8AC3E}">
-        <p14:creationId xmlns:p14="http://schemas.microsoft.com/office/powerpoint/2010/main" val="1362832935"/>
+        <p14:creationId xmlns:p14="http://schemas.microsoft.com/office/powerpoint/2010/main" val="1737998889"/>
       </p:ext>
     </p:extLst>
   </p:cSld>
@@ -1821,15 +1829,7 @@
           <a:p>
             <a:r>
               <a:rPr lang="en-US" dirty="0"/>
-              <a:t>The version of Pester in windows 10 does not have New-</a:t>
-            </a:r>
-            <a:r>
-              <a:rPr lang="en-US" dirty="0" err="1"/>
-              <a:t>MockObject</a:t>
-            </a:r>
-            <a:r>
-              <a:rPr lang="en-US" dirty="0"/>
-              <a:t>.</a:t>
+              <a:t>The majority of the tests we you are going to write are unit tests.</a:t>
             </a:r>
           </a:p>
         </p:txBody>
@@ -1851,7 +1851,7 @@
           <a:p>
             <a:fld id="{C7B05CAA-7DFD-4456-A943-C499583EE113}" type="slidenum">
               <a:rPr lang="en-US" smtClean="0"/>
-              <a:t>27</a:t>
+              <a:t>26</a:t>
             </a:fld>
             <a:endParaRPr lang="en-US"/>
           </a:p>
@@ -1860,7 +1860,7 @@
     </p:spTree>
     <p:extLst>
       <p:ext uri="{BB962C8B-B14F-4D97-AF65-F5344CB8AC3E}">
-        <p14:creationId xmlns:p14="http://schemas.microsoft.com/office/powerpoint/2010/main" val="860753340"/>
+        <p14:creationId xmlns:p14="http://schemas.microsoft.com/office/powerpoint/2010/main" val="1362832935"/>
       </p:ext>
     </p:extLst>
   </p:cSld>
@@ -1916,7 +1916,15 @@
           <a:p>
             <a:r>
               <a:rPr lang="en-US" dirty="0"/>
-              <a:t>What the heck happens if a property you are trying to search for doesn’t exist?</a:t>
+              <a:t>The version of Pester in windows 10 does not have New-</a:t>
+            </a:r>
+            <a:r>
+              <a:rPr lang="en-US" dirty="0" err="1"/>
+              <a:t>MockObject</a:t>
+            </a:r>
+            <a:r>
+              <a:rPr lang="en-US" dirty="0"/>
+              <a:t>.</a:t>
             </a:r>
           </a:p>
         </p:txBody>
@@ -1938,7 +1946,7 @@
           <a:p>
             <a:fld id="{C7B05CAA-7DFD-4456-A943-C499583EE113}" type="slidenum">
               <a:rPr lang="en-US" smtClean="0"/>
-              <a:t>28</a:t>
+              <a:t>27</a:t>
             </a:fld>
             <a:endParaRPr lang="en-US"/>
           </a:p>
@@ -1947,7 +1955,7 @@
     </p:spTree>
     <p:extLst>
       <p:ext uri="{BB962C8B-B14F-4D97-AF65-F5344CB8AC3E}">
-        <p14:creationId xmlns:p14="http://schemas.microsoft.com/office/powerpoint/2010/main" val="1892057454"/>
+        <p14:creationId xmlns:p14="http://schemas.microsoft.com/office/powerpoint/2010/main" val="860753340"/>
       </p:ext>
     </p:extLst>
   </p:cSld>
@@ -2003,7 +2011,7 @@
           <a:p>
             <a:r>
               <a:rPr lang="en-US" dirty="0"/>
-              <a:t>The majority of the tests we you are going to write are unit tests.</a:t>
+              <a:t>What the heck happens if a property you are trying to search for doesn’t exist?</a:t>
             </a:r>
           </a:p>
         </p:txBody>
@@ -2025,7 +2033,7 @@
           <a:p>
             <a:fld id="{C7B05CAA-7DFD-4456-A943-C499583EE113}" type="slidenum">
               <a:rPr lang="en-US" smtClean="0"/>
-              <a:t>30</a:t>
+              <a:t>28</a:t>
             </a:fld>
             <a:endParaRPr lang="en-US"/>
           </a:p>
@@ -2034,7 +2042,7 @@
     </p:spTree>
     <p:extLst>
       <p:ext uri="{BB962C8B-B14F-4D97-AF65-F5344CB8AC3E}">
-        <p14:creationId xmlns:p14="http://schemas.microsoft.com/office/powerpoint/2010/main" val="2335363100"/>
+        <p14:creationId xmlns:p14="http://schemas.microsoft.com/office/powerpoint/2010/main" val="1892057454"/>
       </p:ext>
     </p:extLst>
   </p:cSld>
@@ -2112,6 +2120,93 @@
           <a:p>
             <a:fld id="{C7B05CAA-7DFD-4456-A943-C499583EE113}" type="slidenum">
               <a:rPr lang="en-US" smtClean="0"/>
+              <a:t>30</a:t>
+            </a:fld>
+            <a:endParaRPr lang="en-US"/>
+          </a:p>
+        </p:txBody>
+      </p:sp>
+    </p:spTree>
+    <p:extLst>
+      <p:ext uri="{BB962C8B-B14F-4D97-AF65-F5344CB8AC3E}">
+        <p14:creationId xmlns:p14="http://schemas.microsoft.com/office/powerpoint/2010/main" val="2335363100"/>
+      </p:ext>
+    </p:extLst>
+  </p:cSld>
+  <p:clrMapOvr>
+    <a:masterClrMapping/>
+  </p:clrMapOvr>
+</p:notes>
+</file>
+
+<file path=ppt/notesSlides/notesSlide25.xml><?xml version="1.0" encoding="utf-8"?>
+<p:notes xmlns:a="http://schemas.openxmlformats.org/drawingml/2006/main" xmlns:r="http://schemas.openxmlformats.org/officeDocument/2006/relationships" xmlns:p="http://schemas.openxmlformats.org/presentationml/2006/main">
+  <p:cSld>
+    <p:spTree>
+      <p:nvGrpSpPr>
+        <p:cNvPr id="1" name=""/>
+        <p:cNvGrpSpPr/>
+        <p:nvPr/>
+      </p:nvGrpSpPr>
+      <p:grpSpPr>
+        <a:xfrm>
+          <a:off x="0" y="0"/>
+          <a:ext cx="0" cy="0"/>
+          <a:chOff x="0" y="0"/>
+          <a:chExt cx="0" cy="0"/>
+        </a:xfrm>
+      </p:grpSpPr>
+      <p:sp>
+        <p:nvSpPr>
+          <p:cNvPr id="2" name="Slide Image Placeholder 1"/>
+          <p:cNvSpPr>
+            <a:spLocks noGrp="1" noRot="1" noChangeAspect="1"/>
+          </p:cNvSpPr>
+          <p:nvPr>
+            <p:ph type="sldImg"/>
+          </p:nvPr>
+        </p:nvSpPr>
+        <p:spPr/>
+      </p:sp>
+      <p:sp>
+        <p:nvSpPr>
+          <p:cNvPr id="3" name="Notes Placeholder 2"/>
+          <p:cNvSpPr>
+            <a:spLocks noGrp="1"/>
+          </p:cNvSpPr>
+          <p:nvPr>
+            <p:ph type="body" idx="1"/>
+          </p:nvPr>
+        </p:nvSpPr>
+        <p:spPr/>
+        <p:txBody>
+          <a:bodyPr/>
+          <a:lstStyle/>
+          <a:p>
+            <a:r>
+              <a:rPr lang="en-US" dirty="0"/>
+              <a:t>The majority of the tests we you are going to write are unit tests.</a:t>
+            </a:r>
+          </a:p>
+        </p:txBody>
+      </p:sp>
+      <p:sp>
+        <p:nvSpPr>
+          <p:cNvPr id="4" name="Slide Number Placeholder 3"/>
+          <p:cNvSpPr>
+            <a:spLocks noGrp="1"/>
+          </p:cNvSpPr>
+          <p:nvPr>
+            <p:ph type="sldNum" sz="quarter" idx="5"/>
+          </p:nvPr>
+        </p:nvSpPr>
+        <p:spPr/>
+        <p:txBody>
+          <a:bodyPr/>
+          <a:lstStyle/>
+          <a:p>
+            <a:fld id="{C7B05CAA-7DFD-4456-A943-C499583EE113}" type="slidenum">
+              <a:rPr lang="en-US" smtClean="0"/>
               <a:t>31</a:t>
             </a:fld>
             <a:endParaRPr lang="en-US"/>
@@ -2131,7 +2226,7 @@
 </p:notes>
 </file>
 
-<file path=ppt/notesSlides/notesSlide25.xml><?xml version="1.0" encoding="utf-8"?>
+<file path=ppt/notesSlides/notesSlide26.xml><?xml version="1.0" encoding="utf-8"?>
 <p:notes xmlns:a="http://schemas.openxmlformats.org/drawingml/2006/main" xmlns:r="http://schemas.openxmlformats.org/officeDocument/2006/relationships" xmlns:p="http://schemas.openxmlformats.org/presentationml/2006/main">
   <p:cSld>
     <p:spTree>
@@ -19334,6 +19429,15 @@
 </file>
 
 <file path=customXml/item1.xml><?xml version="1.0" encoding="utf-8"?>
+<?mso-contentType ?>
+<FormTemplates xmlns="http://schemas.microsoft.com/sharepoint/v3/contenttype/forms">
+  <Display>DocumentLibraryForm</Display>
+  <Edit>DocumentLibraryForm</Edit>
+  <New>DocumentLibraryForm</New>
+</FormTemplates>
+</file>
+
+<file path=customXml/item2.xml><?xml version="1.0" encoding="utf-8"?>
 <ct:contentTypeSchema xmlns:ct="http://schemas.microsoft.com/office/2006/metadata/contentType" xmlns:ma="http://schemas.microsoft.com/office/2006/metadata/properties/metaAttributes" ct:_="" ma:_="" ma:contentTypeName="Document" ma:contentTypeID="0x010100CFD7474EC5F9804A8C0915A0D2B3E72B" ma:contentTypeVersion="6" ma:contentTypeDescription="Create a new document." ma:contentTypeScope="" ma:versionID="1e506071d132a47b68c5589909b09f0e">
   <xsd:schema xmlns:xsd="http://www.w3.org/2001/XMLSchema" xmlns:xs="http://www.w3.org/2001/XMLSchema" xmlns:p="http://schemas.microsoft.com/office/2006/metadata/properties" xmlns:ns2="437d3976-146d-487e-9b32-45ade7cdb3c3" xmlns:ns3="ba924082-f255-4689-bc14-7c311a17681c" targetNamespace="http://schemas.microsoft.com/office/2006/metadata/properties" ma:root="true" ma:fieldsID="d9451a99ae5dfcf301f63b02ef9f83d5" ns2:_="" ns3:_="">
     <xsd:import namespace="437d3976-146d-487e-9b32-45ade7cdb3c3"/>
@@ -19512,15 +19616,6 @@
 </ct:contentTypeSchema>
 </file>
 
-<file path=customXml/item2.xml><?xml version="1.0" encoding="utf-8"?>
-<?mso-contentType ?>
-<FormTemplates xmlns="http://schemas.microsoft.com/sharepoint/v3/contenttype/forms">
-  <Display>DocumentLibraryForm</Display>
-  <Edit>DocumentLibraryForm</Edit>
-  <New>DocumentLibraryForm</New>
-</FormTemplates>
-</file>
-
 <file path=customXml/item3.xml><?xml version="1.0" encoding="utf-8"?>
 <p:properties xmlns:p="http://schemas.microsoft.com/office/2006/metadata/properties" xmlns:xsi="http://www.w3.org/2001/XMLSchema-instance" xmlns:pc="http://schemas.microsoft.com/office/infopath/2007/PartnerControls">
   <documentManagement/>
@@ -19528,6 +19623,14 @@
 </file>
 
 <file path=customXml/itemProps1.xml><?xml version="1.0" encoding="utf-8"?>
+<ds:datastoreItem xmlns:ds="http://schemas.openxmlformats.org/officeDocument/2006/customXml" ds:itemID="{8F9099B0-B9E3-45A6-848D-7EA25626C078}">
+  <ds:schemaRefs>
+    <ds:schemaRef ds:uri="http://schemas.microsoft.com/sharepoint/v3/contenttype/forms"/>
+  </ds:schemaRefs>
+</ds:datastoreItem>
+</file>
+
+<file path=customXml/itemProps2.xml><?xml version="1.0" encoding="utf-8"?>
 <ds:datastoreItem xmlns:ds="http://schemas.openxmlformats.org/officeDocument/2006/customXml" ds:itemID="{1881FD18-C877-47D9-A9C8-9B9EB7A5D424}">
   <ds:schemaRefs>
     <ds:schemaRef ds:uri="http://schemas.microsoft.com/office/2006/metadata/contentType"/>
@@ -19542,14 +19645,6 @@
     <ds:schemaRef ds:uri="http://purl.org/dc/elements/1.1/"/>
     <ds:schemaRef ds:uri="http://purl.org/dc/terms/"/>
     <ds:schemaRef ds:uri="http://schemas.microsoft.com/internal/obd"/>
-  </ds:schemaRefs>
-</ds:datastoreItem>
-</file>
-
-<file path=customXml/itemProps2.xml><?xml version="1.0" encoding="utf-8"?>
-<ds:datastoreItem xmlns:ds="http://schemas.openxmlformats.org/officeDocument/2006/customXml" ds:itemID="{8F9099B0-B9E3-45A6-848D-7EA25626C078}">
-  <ds:schemaRefs>
-    <ds:schemaRef ds:uri="http://schemas.microsoft.com/sharepoint/v3/contenttype/forms"/>
   </ds:schemaRefs>
 </ds:datastoreItem>
 </file>

</xml_diff>

<commit_message>
fixed some tests and renamed folders
</commit_message>
<xml_diff>
--- a/Pester Practically Perfect PowerShell.pptx
+++ b/Pester Practically Perfect PowerShell.pptx
@@ -333,7 +333,7 @@
           <a:p>
             <a:fld id="{EC2CC04A-C335-487A-8178-6C90F0F29C95}" type="datetimeFigureOut">
               <a:rPr lang="en-US" smtClean="0"/>
-              <a:t>3/16/2019</a:t>
+              <a:t>3/20/2019</a:t>
             </a:fld>
             <a:endParaRPr lang="en-US"/>
           </a:p>
@@ -1177,13 +1177,8 @@
           <a:p>
             <a:r>
               <a:rPr lang="en-US" dirty="0"/>
-              <a:t>Working with </a:t>
-            </a:r>
-            <a:r>
-              <a:rPr lang="en-US"/>
-              <a:t>our module.</a:t>
-            </a:r>
-            <a:endParaRPr lang="en-US" dirty="0"/>
+              <a:t>Working with our module.  You have this module and you are starting to use it!  Let’s test how you are using it.</a:t>
+            </a:r>
           </a:p>
         </p:txBody>
       </p:sp>
@@ -1732,15 +1727,7 @@
           <a:p>
             <a:r>
               <a:rPr lang="en-US" dirty="0"/>
-              <a:t>After running this through some list that are hundreds of thousands of items</a:t>
-            </a:r>
-            <a:r>
-              <a:rPr lang="en-US"/>
-              <a:t>, its time </a:t>
-            </a:r>
-            <a:r>
-              <a:rPr lang="en-US" dirty="0"/>
-              <a:t>to convert to an array list</a:t>
+              <a:t>After running this through some list that are hundreds of thousands of items, its time to convert to an array list</a:t>
             </a:r>
           </a:p>
         </p:txBody>
@@ -7446,10 +7433,16 @@
             </a:r>
           </a:p>
           <a:p>
+            <a:endParaRPr lang="en-US" dirty="0"/>
+          </a:p>
+          <a:p>
             <a:r>
               <a:rPr lang="en-US" dirty="0"/>
               <a:t>It is the only way to self peer review your code.</a:t>
             </a:r>
+          </a:p>
+          <a:p>
+            <a:endParaRPr lang="en-US" dirty="0"/>
           </a:p>
           <a:p>
             <a:r>
@@ -7737,6 +7730,9 @@
             </a:r>
           </a:p>
           <a:p>
+            <a:endParaRPr lang="en-US" dirty="0"/>
+          </a:p>
+          <a:p>
             <a:r>
               <a:rPr lang="en-US" dirty="0"/>
               <a:t>It</a:t>
@@ -7763,7 +7759,7 @@
             <a:pPr lvl="1"/>
             <a:r>
               <a:rPr lang="en-US" dirty="0"/>
-              <a:t>Assertion of something </a:t>
+              <a:t>Assertion of something</a:t>
             </a:r>
           </a:p>
           <a:p>
@@ -7985,6 +7981,41 @@
             </a:r>
           </a:p>
           <a:p>
+            <a:endParaRPr lang="en-US" dirty="0"/>
+          </a:p>
+          <a:p>
+            <a:r>
+              <a:rPr lang="en-US" dirty="0"/>
+              <a:t>Have a separate test for each </a:t>
+            </a:r>
+            <a:r>
+              <a:rPr lang="en-US" dirty="0" err="1"/>
+              <a:t>CmdLet</a:t>
+            </a:r>
+            <a:endParaRPr lang="en-US" dirty="0"/>
+          </a:p>
+          <a:p>
+            <a:endParaRPr lang="en-US" dirty="0"/>
+          </a:p>
+          <a:p>
+            <a:r>
+              <a:rPr lang="en-US" dirty="0"/>
+              <a:t>Name the Describe block the name of the </a:t>
+            </a:r>
+            <a:r>
+              <a:rPr lang="en-US" dirty="0" err="1"/>
+              <a:t>CmdLet</a:t>
+            </a:r>
+            <a:endParaRPr lang="en-US" dirty="0"/>
+          </a:p>
+          <a:p>
+            <a:pPr lvl="1"/>
+            <a:r>
+              <a:rPr lang="en-US" dirty="0"/>
+              <a:t>Our whatever standard you want to use, but have one.</a:t>
+            </a:r>
+          </a:p>
+          <a:p>
             <a:pPr marL="0" indent="0">
               <a:buNone/>
             </a:pPr>
@@ -8130,7 +8161,7 @@
             <a:pPr lvl="1"/>
             <a:r>
               <a:rPr lang="en-US" dirty="0"/>
-              <a:t>No interaction with the environment.</a:t>
+              <a:t>Enforces no interaction with the environment.</a:t>
             </a:r>
           </a:p>
           <a:p>
@@ -8534,7 +8565,25 @@
           <a:p>
             <a:r>
               <a:rPr lang="en-US" dirty="0"/>
-              <a:t>Ensure a specific Mock is called</a:t>
+              <a:t>Ensure a specific Mock is called or not.</a:t>
+            </a:r>
+          </a:p>
+          <a:p>
+            <a:endParaRPr lang="en-US" dirty="0"/>
+          </a:p>
+          <a:p>
+            <a:r>
+              <a:rPr lang="en-US" dirty="0"/>
+              <a:t>Ensure a specific mock was called a certain amount of times.</a:t>
+            </a:r>
+          </a:p>
+          <a:p>
+            <a:endParaRPr lang="en-US" dirty="0"/>
+          </a:p>
+          <a:p>
+            <a:r>
+              <a:rPr lang="en-US" dirty="0"/>
+              <a:t>Ensure a mock was called in a specific Scope.</a:t>
             </a:r>
           </a:p>
           <a:p>
@@ -9235,16 +9284,25 @@
             </a:r>
           </a:p>
           <a:p>
+            <a:endParaRPr lang="en-US" dirty="0"/>
+          </a:p>
+          <a:p>
             <a:r>
               <a:rPr lang="en-US" dirty="0"/>
               <a:t>It is only for modules.</a:t>
             </a:r>
           </a:p>
           <a:p>
+            <a:endParaRPr lang="en-US" dirty="0"/>
+          </a:p>
+          <a:p>
             <a:r>
               <a:rPr lang="en-US" dirty="0"/>
               <a:t>Somethings are not testable.</a:t>
             </a:r>
+          </a:p>
+          <a:p>
+            <a:endParaRPr lang="en-US" dirty="0"/>
           </a:p>
           <a:p>
             <a:r>
@@ -9423,6 +9481,15 @@
             <a:r>
               <a:rPr lang="en-US" dirty="0"/>
               <a:t>Not write-host</a:t>
+            </a:r>
+          </a:p>
+          <a:p>
+            <a:endParaRPr lang="en-US" dirty="0"/>
+          </a:p>
+          <a:p>
+            <a:r>
+              <a:rPr lang="en-US" dirty="0"/>
+              <a:t>Functions should return one and only type of thing.</a:t>
             </a:r>
           </a:p>
           <a:p>
@@ -19434,18 +19501,18 @@
 </file>
 
 <file path=customXml/item2.xml><?xml version="1.0" encoding="utf-8"?>
+<p:properties xmlns:p="http://schemas.microsoft.com/office/2006/metadata/properties" xmlns:xsi="http://www.w3.org/2001/XMLSchema-instance" xmlns:pc="http://schemas.microsoft.com/office/infopath/2007/PartnerControls">
+  <documentManagement/>
+</p:properties>
+</file>
+
+<file path=customXml/item3.xml><?xml version="1.0" encoding="utf-8"?>
 <?mso-contentType ?>
 <FormTemplates xmlns="http://schemas.microsoft.com/sharepoint/v3/contenttype/forms">
   <Display>DocumentLibraryForm</Display>
   <Edit>DocumentLibraryForm</Edit>
   <New>DocumentLibraryForm</New>
 </FormTemplates>
-</file>
-
-<file path=customXml/item3.xml><?xml version="1.0" encoding="utf-8"?>
-<p:properties xmlns:p="http://schemas.microsoft.com/office/2006/metadata/properties" xmlns:xsi="http://www.w3.org/2001/XMLSchema-instance" xmlns:pc="http://schemas.microsoft.com/office/infopath/2007/PartnerControls">
-  <documentManagement/>
-</p:properties>
 </file>
 
 <file path=customXml/itemProps1.xml><?xml version="1.0" encoding="utf-8"?>
@@ -19468,14 +19535,6 @@
 </file>
 
 <file path=customXml/itemProps2.xml><?xml version="1.0" encoding="utf-8"?>
-<ds:datastoreItem xmlns:ds="http://schemas.openxmlformats.org/officeDocument/2006/customXml" ds:itemID="{8F9099B0-B9E3-45A6-848D-7EA25626C078}">
-  <ds:schemaRefs>
-    <ds:schemaRef ds:uri="http://schemas.microsoft.com/sharepoint/v3/contenttype/forms"/>
-  </ds:schemaRefs>
-</ds:datastoreItem>
-</file>
-
-<file path=customXml/itemProps3.xml><?xml version="1.0" encoding="utf-8"?>
 <ds:datastoreItem xmlns:ds="http://schemas.openxmlformats.org/officeDocument/2006/customXml" ds:itemID="{AFF96CB3-579C-4369-8AB2-D91B353AC245}">
   <ds:schemaRefs>
     <ds:schemaRef ds:uri="http://purl.org/dc/terms/"/>
@@ -19490,4 +19549,12 @@
     <ds:schemaRef ds:uri="http://www.w3.org/XML/1998/namespace"/>
   </ds:schemaRefs>
 </ds:datastoreItem>
+</file>
+
+<file path=customXml/itemProps3.xml><?xml version="1.0" encoding="utf-8"?>
+<ds:datastoreItem xmlns:ds="http://schemas.openxmlformats.org/officeDocument/2006/customXml" ds:itemID="{8F9099B0-B9E3-45A6-848D-7EA25626C078}">
+  <ds:schemaRefs>
+    <ds:schemaRef ds:uri="http://schemas.microsoft.com/sharepoint/v3/contenttype/forms"/>
+  </ds:schemaRefs>
+</ds:datastoreItem>
 </file>
</xml_diff>

<commit_message>
updating pester ver and other small things
</commit_message>
<xml_diff>
--- a/Pester Practically Perfect PowerShell.pptx
+++ b/Pester Practically Perfect PowerShell.pptx
@@ -333,7 +333,7 @@
           <a:p>
             <a:fld id="{EC2CC04A-C335-487A-8178-6C90F0F29C95}" type="datetimeFigureOut">
               <a:rPr lang="en-US" smtClean="0"/>
-              <a:t>3/20/2019</a:t>
+              <a:t>4/5/2019</a:t>
             </a:fld>
             <a:endParaRPr lang="en-US"/>
           </a:p>
@@ -8574,7 +8574,7 @@
           <a:p>
             <a:r>
               <a:rPr lang="en-US" dirty="0"/>
-              <a:t>Ensure a specific mock was called a certain amount of times.</a:t>
+              <a:t>Ensure a specific Mock was called a certain amount of times.</a:t>
             </a:r>
           </a:p>
           <a:p>
@@ -8583,7 +8583,7 @@
           <a:p>
             <a:r>
               <a:rPr lang="en-US" dirty="0"/>
-              <a:t>Ensure a mock was called in a specific Scope.</a:t>
+              <a:t>Ensure a Mock was called in a specific Scope.</a:t>
             </a:r>
           </a:p>
           <a:p>
@@ -8593,7 +8593,7 @@
           <a:p>
             <a:r>
               <a:rPr lang="en-US" dirty="0"/>
-              <a:t>You can add a parameter filter to a mock or an assertion.</a:t>
+              <a:t>You can add a parameter filter to a Mock or an Assertion.</a:t>
             </a:r>
           </a:p>
           <a:p>
@@ -8888,15 +8888,7 @@
             <a:pPr lvl="1"/>
             <a:r>
               <a:rPr lang="en-US" dirty="0"/>
-              <a:t>Be prepared to write functions for each </a:t>
-            </a:r>
-            <a:r>
-              <a:rPr lang="en-US" dirty="0" err="1"/>
-              <a:t>.net</a:t>
-            </a:r>
-            <a:r>
-              <a:rPr lang="en-US" dirty="0"/>
-              <a:t> method you need to test.</a:t>
+              <a:t>Be prepared to write functions for each .NET method you need to test.</a:t>
             </a:r>
           </a:p>
           <a:p>
@@ -19322,6 +19314,12 @@
 </file>
 
 <file path=customXml/item1.xml><?xml version="1.0" encoding="utf-8"?>
+<p:properties xmlns:p="http://schemas.microsoft.com/office/2006/metadata/properties" xmlns:xsi="http://www.w3.org/2001/XMLSchema-instance" xmlns:pc="http://schemas.microsoft.com/office/infopath/2007/PartnerControls">
+  <documentManagement/>
+</p:properties>
+</file>
+
+<file path=customXml/item2.xml><?xml version="1.0" encoding="utf-8"?>
 <ct:contentTypeSchema xmlns:ct="http://schemas.microsoft.com/office/2006/metadata/contentType" xmlns:ma="http://schemas.microsoft.com/office/2006/metadata/properties/metaAttributes" ct:_="" ma:_="" ma:contentTypeName="Document" ma:contentTypeID="0x010100CFD7474EC5F9804A8C0915A0D2B3E72B" ma:contentTypeVersion="6" ma:contentTypeDescription="Create a new document." ma:contentTypeScope="" ma:versionID="1e506071d132a47b68c5589909b09f0e">
   <xsd:schema xmlns:xsd="http://www.w3.org/2001/XMLSchema" xmlns:xs="http://www.w3.org/2001/XMLSchema" xmlns:p="http://schemas.microsoft.com/office/2006/metadata/properties" xmlns:ns2="437d3976-146d-487e-9b32-45ade7cdb3c3" xmlns:ns3="ba924082-f255-4689-bc14-7c311a17681c" targetNamespace="http://schemas.microsoft.com/office/2006/metadata/properties" ma:root="true" ma:fieldsID="d9451a99ae5dfcf301f63b02ef9f83d5" ns2:_="" ns3:_="">
     <xsd:import namespace="437d3976-146d-487e-9b32-45ade7cdb3c3"/>
@@ -19500,12 +19498,6 @@
 </ct:contentTypeSchema>
 </file>
 
-<file path=customXml/item2.xml><?xml version="1.0" encoding="utf-8"?>
-<p:properties xmlns:p="http://schemas.microsoft.com/office/2006/metadata/properties" xmlns:xsi="http://www.w3.org/2001/XMLSchema-instance" xmlns:pc="http://schemas.microsoft.com/office/infopath/2007/PartnerControls">
-  <documentManagement/>
-</p:properties>
-</file>
-
 <file path=customXml/item3.xml><?xml version="1.0" encoding="utf-8"?>
 <?mso-contentType ?>
 <FormTemplates xmlns="http://schemas.microsoft.com/sharepoint/v3/contenttype/forms">
@@ -19516,6 +19508,23 @@
 </file>
 
 <file path=customXml/itemProps1.xml><?xml version="1.0" encoding="utf-8"?>
+<ds:datastoreItem xmlns:ds="http://schemas.openxmlformats.org/officeDocument/2006/customXml" ds:itemID="{AFF96CB3-579C-4369-8AB2-D91B353AC245}">
+  <ds:schemaRefs>
+    <ds:schemaRef ds:uri="http://purl.org/dc/terms/"/>
+    <ds:schemaRef ds:uri="http://schemas.microsoft.com/office/infopath/2007/PartnerControls"/>
+    <ds:schemaRef ds:uri="http://purl.org/dc/dcmitype/"/>
+    <ds:schemaRef ds:uri="http://schemas.microsoft.com/office/2006/documentManagement/types"/>
+    <ds:schemaRef ds:uri="437d3976-146d-487e-9b32-45ade7cdb3c3"/>
+    <ds:schemaRef ds:uri="http://purl.org/dc/elements/1.1/"/>
+    <ds:schemaRef ds:uri="http://schemas.microsoft.com/office/2006/metadata/properties"/>
+    <ds:schemaRef ds:uri="ba924082-f255-4689-bc14-7c311a17681c"/>
+    <ds:schemaRef ds:uri="http://schemas.openxmlformats.org/package/2006/metadata/core-properties"/>
+    <ds:schemaRef ds:uri="http://www.w3.org/XML/1998/namespace"/>
+  </ds:schemaRefs>
+</ds:datastoreItem>
+</file>
+
+<file path=customXml/itemProps2.xml><?xml version="1.0" encoding="utf-8"?>
 <ds:datastoreItem xmlns:ds="http://schemas.openxmlformats.org/officeDocument/2006/customXml" ds:itemID="{1881FD18-C877-47D9-A9C8-9B9EB7A5D424}">
   <ds:schemaRefs>
     <ds:schemaRef ds:uri="http://schemas.microsoft.com/office/2006/metadata/contentType"/>
@@ -19534,23 +19543,6 @@
 </ds:datastoreItem>
 </file>
 
-<file path=customXml/itemProps2.xml><?xml version="1.0" encoding="utf-8"?>
-<ds:datastoreItem xmlns:ds="http://schemas.openxmlformats.org/officeDocument/2006/customXml" ds:itemID="{AFF96CB3-579C-4369-8AB2-D91B353AC245}">
-  <ds:schemaRefs>
-    <ds:schemaRef ds:uri="http://purl.org/dc/terms/"/>
-    <ds:schemaRef ds:uri="http://schemas.microsoft.com/office/infopath/2007/PartnerControls"/>
-    <ds:schemaRef ds:uri="http://purl.org/dc/dcmitype/"/>
-    <ds:schemaRef ds:uri="http://schemas.microsoft.com/office/2006/documentManagement/types"/>
-    <ds:schemaRef ds:uri="437d3976-146d-487e-9b32-45ade7cdb3c3"/>
-    <ds:schemaRef ds:uri="http://purl.org/dc/elements/1.1/"/>
-    <ds:schemaRef ds:uri="http://schemas.microsoft.com/office/2006/metadata/properties"/>
-    <ds:schemaRef ds:uri="ba924082-f255-4689-bc14-7c311a17681c"/>
-    <ds:schemaRef ds:uri="http://schemas.openxmlformats.org/package/2006/metadata/core-properties"/>
-    <ds:schemaRef ds:uri="http://www.w3.org/XML/1998/namespace"/>
-  </ds:schemaRefs>
-</ds:datastoreItem>
-</file>
-
 <file path=customXml/itemProps3.xml><?xml version="1.0" encoding="utf-8"?>
 <ds:datastoreItem xmlns:ds="http://schemas.openxmlformats.org/officeDocument/2006/customXml" ds:itemID="{8F9099B0-B9E3-45A6-848D-7EA25626C078}">
   <ds:schemaRefs>

</xml_diff>

<commit_message>
removing whitespace from code
</commit_message>
<xml_diff>
--- a/Pester Practically Perfect PowerShell.pptx
+++ b/Pester Practically Perfect PowerShell.pptx
@@ -13,33 +13,33 @@
     <p:sldId id="281" r:id="rId7"/>
     <p:sldId id="260" r:id="rId8"/>
     <p:sldId id="278" r:id="rId9"/>
-    <p:sldId id="282" r:id="rId10"/>
-    <p:sldId id="283" r:id="rId11"/>
-    <p:sldId id="284" r:id="rId12"/>
-    <p:sldId id="285" r:id="rId13"/>
-    <p:sldId id="289" r:id="rId14"/>
-    <p:sldId id="286" r:id="rId15"/>
-    <p:sldId id="288" r:id="rId16"/>
-    <p:sldId id="309" r:id="rId17"/>
-    <p:sldId id="267" r:id="rId18"/>
-    <p:sldId id="293" r:id="rId19"/>
-    <p:sldId id="307" r:id="rId20"/>
-    <p:sldId id="305" r:id="rId21"/>
-    <p:sldId id="292" r:id="rId22"/>
-    <p:sldId id="308" r:id="rId23"/>
-    <p:sldId id="295" r:id="rId24"/>
-    <p:sldId id="297" r:id="rId25"/>
-    <p:sldId id="310" r:id="rId26"/>
-    <p:sldId id="311" r:id="rId27"/>
-    <p:sldId id="298" r:id="rId28"/>
-    <p:sldId id="299" r:id="rId29"/>
-    <p:sldId id="306" r:id="rId30"/>
-    <p:sldId id="301" r:id="rId31"/>
-    <p:sldId id="302" r:id="rId32"/>
-    <p:sldId id="290" r:id="rId33"/>
-    <p:sldId id="303" r:id="rId34"/>
-    <p:sldId id="304" r:id="rId35"/>
-    <p:sldId id="258" r:id="rId36"/>
+    <p:sldId id="283" r:id="rId10"/>
+    <p:sldId id="284" r:id="rId11"/>
+    <p:sldId id="285" r:id="rId12"/>
+    <p:sldId id="289" r:id="rId13"/>
+    <p:sldId id="286" r:id="rId14"/>
+    <p:sldId id="288" r:id="rId15"/>
+    <p:sldId id="309" r:id="rId16"/>
+    <p:sldId id="267" r:id="rId17"/>
+    <p:sldId id="293" r:id="rId18"/>
+    <p:sldId id="307" r:id="rId19"/>
+    <p:sldId id="305" r:id="rId20"/>
+    <p:sldId id="292" r:id="rId21"/>
+    <p:sldId id="308" r:id="rId22"/>
+    <p:sldId id="295" r:id="rId23"/>
+    <p:sldId id="297" r:id="rId24"/>
+    <p:sldId id="310" r:id="rId25"/>
+    <p:sldId id="311" r:id="rId26"/>
+    <p:sldId id="298" r:id="rId27"/>
+    <p:sldId id="299" r:id="rId28"/>
+    <p:sldId id="306" r:id="rId29"/>
+    <p:sldId id="301" r:id="rId30"/>
+    <p:sldId id="302" r:id="rId31"/>
+    <p:sldId id="290" r:id="rId32"/>
+    <p:sldId id="303" r:id="rId33"/>
+    <p:sldId id="304" r:id="rId34"/>
+    <p:sldId id="258" r:id="rId35"/>
+    <p:sldId id="282" r:id="rId36"/>
     <p:sldId id="259" r:id="rId37"/>
     <p:sldId id="279" r:id="rId38"/>
     <p:sldId id="287" r:id="rId39"/>
@@ -171,7 +171,6 @@
             <p14:sldId id="281"/>
             <p14:sldId id="260"/>
             <p14:sldId id="278"/>
-            <p14:sldId id="282"/>
             <p14:sldId id="283"/>
             <p14:sldId id="284"/>
             <p14:sldId id="285"/>
@@ -202,6 +201,7 @@
         </p14:section>
         <p14:section name="Closing" id="{49CB15AC-FD56-4AAC-8B8A-68CF2CB85A39}">
           <p14:sldIdLst>
+            <p14:sldId id="282"/>
             <p14:sldId id="259"/>
             <p14:sldId id="279"/>
           </p14:sldIdLst>
@@ -333,7 +333,7 @@
           <a:p>
             <a:fld id="{EC2CC04A-C335-487A-8178-6C90F0F29C95}" type="datetimeFigureOut">
               <a:rPr lang="en-US" smtClean="0"/>
-              <a:t>4/17/2019</a:t>
+              <a:t>4/30/2019</a:t>
             </a:fld>
             <a:endParaRPr lang="en-US"/>
           </a:p>
@@ -739,7 +739,15 @@
           <a:p>
             <a:r>
               <a:rPr lang="en-US" dirty="0"/>
-              <a:t>The majority of the tests we you are going to write are unit tests.</a:t>
+              <a:t>The </a:t>
+            </a:r>
+            <a:r>
+              <a:rPr lang="en-US" dirty="0" err="1"/>
+              <a:t>stringCombiner</a:t>
+            </a:r>
+            <a:r>
+              <a:rPr lang="en-US" dirty="0"/>
+              <a:t> was a smashing success.  As happens with any automation effort, once you have shown some success people are screaming for more! Now people are asking for a way to uniquely sort any objects!  You quickly decide that if you need to handle dynamic inputs (parameters) you need a function.  What are the possible tests cases now?  Hang on I forgot a few test cases…</a:t>
             </a:r>
           </a:p>
         </p:txBody>
@@ -761,7 +769,7 @@
           <a:p>
             <a:fld id="{C7B05CAA-7DFD-4456-A943-C499583EE113}" type="slidenum">
               <a:rPr lang="en-US" smtClean="0"/>
-              <a:t>13</a:t>
+              <a:t>14</a:t>
             </a:fld>
             <a:endParaRPr lang="en-US"/>
           </a:p>
@@ -770,7 +778,7 @@
     </p:spTree>
     <p:extLst>
       <p:ext uri="{BB962C8B-B14F-4D97-AF65-F5344CB8AC3E}">
-        <p14:creationId xmlns:p14="http://schemas.microsoft.com/office/powerpoint/2010/main" val="1546059689"/>
+        <p14:creationId xmlns:p14="http://schemas.microsoft.com/office/powerpoint/2010/main" val="2945657663"/>
       </p:ext>
     </p:extLst>
   </p:cSld>
@@ -826,15 +834,7 @@
           <a:p>
             <a:r>
               <a:rPr lang="en-US" dirty="0"/>
-              <a:t>The </a:t>
-            </a:r>
-            <a:r>
-              <a:rPr lang="en-US" dirty="0" err="1"/>
-              <a:t>stringCombiner</a:t>
-            </a:r>
-            <a:r>
-              <a:rPr lang="en-US" dirty="0"/>
-              <a:t> was a smashing success.  As happens with any automation effort, once you have shown some success people are screaming for more! Now people are asking for a way to uniquely sort any objects!  You quickly decide that if you need to handle dynamic inputs (parameters) you need a function.  What are the possible tests cases now?  Hang on I forgot a few test cases…</a:t>
+              <a:t>There are things that happen in a module that stay in the module.  Pester has a way to scope that for you.</a:t>
             </a:r>
           </a:p>
         </p:txBody>
@@ -865,7 +865,7 @@
     </p:spTree>
     <p:extLst>
       <p:ext uri="{BB962C8B-B14F-4D97-AF65-F5344CB8AC3E}">
-        <p14:creationId xmlns:p14="http://schemas.microsoft.com/office/powerpoint/2010/main" val="2945657663"/>
+        <p14:creationId xmlns:p14="http://schemas.microsoft.com/office/powerpoint/2010/main" val="2557059099"/>
       </p:ext>
     </p:extLst>
   </p:cSld>
@@ -920,9 +920,10 @@
           <a:lstStyle/>
           <a:p>
             <a:r>
-              <a:rPr lang="en-US" dirty="0"/>
-              <a:t>There are things that happen in a module that stay in the module.  Pester has a way to scope that for you.</a:t>
-            </a:r>
+              <a:rPr lang="en-US" dirty="0" err="1"/>
+              <a:t>ConvertTo-DuplicateSortedList</a:t>
+            </a:r>
+            <a:endParaRPr lang="en-US" dirty="0"/>
           </a:p>
         </p:txBody>
       </p:sp>
@@ -952,7 +953,7 @@
     </p:spTree>
     <p:extLst>
       <p:ext uri="{BB962C8B-B14F-4D97-AF65-F5344CB8AC3E}">
-        <p14:creationId xmlns:p14="http://schemas.microsoft.com/office/powerpoint/2010/main" val="2557059099"/>
+        <p14:creationId xmlns:p14="http://schemas.microsoft.com/office/powerpoint/2010/main" val="1408529167"/>
       </p:ext>
     </p:extLst>
   </p:cSld>
@@ -1007,10 +1008,9 @@
           <a:lstStyle/>
           <a:p>
             <a:r>
-              <a:rPr lang="en-US" dirty="0" err="1"/>
-              <a:t>ConvertTo-DuplicateSortedList</a:t>
-            </a:r>
-            <a:endParaRPr lang="en-US" dirty="0"/>
+              <a:rPr lang="en-US" dirty="0"/>
+              <a:t>The majority of the tests we you are going to write are unit tests.</a:t>
+            </a:r>
           </a:p>
         </p:txBody>
       </p:sp>
@@ -1040,7 +1040,7 @@
     </p:spTree>
     <p:extLst>
       <p:ext uri="{BB962C8B-B14F-4D97-AF65-F5344CB8AC3E}">
-        <p14:creationId xmlns:p14="http://schemas.microsoft.com/office/powerpoint/2010/main" val="1408529167"/>
+        <p14:creationId xmlns:p14="http://schemas.microsoft.com/office/powerpoint/2010/main" val="3014861851"/>
       </p:ext>
     </p:extLst>
   </p:cSld>
@@ -1096,7 +1096,7 @@
           <a:p>
             <a:r>
               <a:rPr lang="en-US" dirty="0"/>
-              <a:t>The majority of the tests we you are going to write are unit tests.</a:t>
+              <a:t>Working with our module.  You have this module and you are starting to use it!  Let’s test how you are using it.</a:t>
             </a:r>
           </a:p>
         </p:txBody>
@@ -1127,7 +1127,7 @@
     </p:spTree>
     <p:extLst>
       <p:ext uri="{BB962C8B-B14F-4D97-AF65-F5344CB8AC3E}">
-        <p14:creationId xmlns:p14="http://schemas.microsoft.com/office/powerpoint/2010/main" val="3014861851"/>
+        <p14:creationId xmlns:p14="http://schemas.microsoft.com/office/powerpoint/2010/main" val="1833343033"/>
       </p:ext>
     </p:extLst>
   </p:cSld>
@@ -1183,7 +1183,7 @@
           <a:p>
             <a:r>
               <a:rPr lang="en-US" dirty="0"/>
-              <a:t>Working with our module.  You have this module and you are starting to use it!  Let’s test how you are using it.</a:t>
+              <a:t>The majority of the tests we you are going to write are unit tests.</a:t>
             </a:r>
           </a:p>
         </p:txBody>
@@ -1214,7 +1214,7 @@
     </p:spTree>
     <p:extLst>
       <p:ext uri="{BB962C8B-B14F-4D97-AF65-F5344CB8AC3E}">
-        <p14:creationId xmlns:p14="http://schemas.microsoft.com/office/powerpoint/2010/main" val="1833343033"/>
+        <p14:creationId xmlns:p14="http://schemas.microsoft.com/office/powerpoint/2010/main" val="1235064172"/>
       </p:ext>
     </p:extLst>
   </p:cSld>
@@ -1269,9 +1269,32 @@
           <a:lstStyle/>
           <a:p>
             <a:r>
-              <a:rPr lang="en-US" dirty="0"/>
-              <a:t>The majority of the tests we you are going to write are unit tests.</a:t>
-            </a:r>
+              <a:rPr lang="en-US" dirty="0" err="1"/>
+              <a:t>Gonna</a:t>
+            </a:r>
+            <a:r>
+              <a:rPr lang="en-US" dirty="0"/>
+              <a:t> kick off pester topic with this </a:t>
+            </a:r>
+            <a:r>
+              <a:rPr lang="en-US" dirty="0" err="1"/>
+              <a:t>tid</a:t>
+            </a:r>
+            <a:r>
+              <a:rPr lang="en-US" dirty="0"/>
+              <a:t> bit. Pester loves functions.  Testing functions is way easier than testing non-functions.  More granular, more loosely coupled, easier to maintain, easy to refactor a billion times easier to test.</a:t>
+            </a:r>
+          </a:p>
+          <a:p>
+            <a:r>
+              <a:rPr lang="en-US" dirty="0"/>
+              <a:t>Get used to </a:t>
+            </a:r>
+            <a:r>
+              <a:rPr lang="en-US"/>
+              <a:t>writing functions.</a:t>
+            </a:r>
+            <a:endParaRPr lang="en-US" dirty="0"/>
           </a:p>
         </p:txBody>
       </p:sp>
@@ -1292,7 +1315,7 @@
           <a:p>
             <a:fld id="{C7B05CAA-7DFD-4456-A943-C499583EE113}" type="slidenum">
               <a:rPr lang="en-US" smtClean="0"/>
-              <a:t>20</a:t>
+              <a:t>21</a:t>
             </a:fld>
             <a:endParaRPr lang="en-US"/>
           </a:p>
@@ -1301,7 +1324,7 @@
     </p:spTree>
     <p:extLst>
       <p:ext uri="{BB962C8B-B14F-4D97-AF65-F5344CB8AC3E}">
-        <p14:creationId xmlns:p14="http://schemas.microsoft.com/office/powerpoint/2010/main" val="1235064172"/>
+        <p14:creationId xmlns:p14="http://schemas.microsoft.com/office/powerpoint/2010/main" val="1688180714"/>
       </p:ext>
     </p:extLst>
   </p:cSld>
@@ -1356,30 +1379,12 @@
           <a:lstStyle/>
           <a:p>
             <a:r>
-              <a:rPr lang="en-US" dirty="0" err="1"/>
-              <a:t>Gonna</a:t>
-            </a:r>
-            <a:r>
-              <a:rPr lang="en-US" dirty="0"/>
-              <a:t> kick off pester topic with this </a:t>
-            </a:r>
-            <a:r>
-              <a:rPr lang="en-US" dirty="0" err="1"/>
-              <a:t>tid</a:t>
-            </a:r>
-            <a:r>
-              <a:rPr lang="en-US" dirty="0"/>
-              <a:t> bit. Pester loves functions.  Testing functions is way easier than testing non-functions.  More granular, more loosely coupled, easier to maintain, easy to refactor a billion times easier to test.</a:t>
-            </a:r>
-          </a:p>
-          <a:p>
-            <a:r>
-              <a:rPr lang="en-US" dirty="0"/>
-              <a:t>Get used to </a:t>
+              <a:rPr lang="en-US" dirty="0"/>
+              <a:t>Working with </a:t>
             </a:r>
             <a:r>
               <a:rPr lang="en-US"/>
-              <a:t>writing functions.</a:t>
+              <a:t>our module.</a:t>
             </a:r>
             <a:endParaRPr lang="en-US" dirty="0"/>
           </a:p>
@@ -1411,7 +1416,7 @@
     </p:spTree>
     <p:extLst>
       <p:ext uri="{BB962C8B-B14F-4D97-AF65-F5344CB8AC3E}">
-        <p14:creationId xmlns:p14="http://schemas.microsoft.com/office/powerpoint/2010/main" val="1688180714"/>
+        <p14:creationId xmlns:p14="http://schemas.microsoft.com/office/powerpoint/2010/main" val="656600684"/>
       </p:ext>
     </p:extLst>
   </p:cSld>
@@ -1467,13 +1472,8 @@
           <a:p>
             <a:r>
               <a:rPr lang="en-US" dirty="0"/>
-              <a:t>Working with </a:t>
-            </a:r>
-            <a:r>
-              <a:rPr lang="en-US"/>
-              <a:t>our module.</a:t>
-            </a:r>
-            <a:endParaRPr lang="en-US" dirty="0"/>
+              <a:t>The majority of the tests we you are going to write are unit tests.</a:t>
+            </a:r>
           </a:p>
         </p:txBody>
       </p:sp>
@@ -1503,7 +1503,7 @@
     </p:spTree>
     <p:extLst>
       <p:ext uri="{BB962C8B-B14F-4D97-AF65-F5344CB8AC3E}">
-        <p14:creationId xmlns:p14="http://schemas.microsoft.com/office/powerpoint/2010/main" val="656600684"/>
+        <p14:creationId xmlns:p14="http://schemas.microsoft.com/office/powerpoint/2010/main" val="2685164170"/>
       </p:ext>
     </p:extLst>
   </p:cSld>
@@ -1559,7 +1559,7 @@
           <a:p>
             <a:r>
               <a:rPr lang="en-US" dirty="0"/>
-              <a:t>The majority of the tests we you are going to write are unit tests.</a:t>
+              <a:t>After running this through some list that are hundreds of thousands of items, its time to convert to an array list</a:t>
             </a:r>
           </a:p>
         </p:txBody>
@@ -1590,7 +1590,7 @@
     </p:spTree>
     <p:extLst>
       <p:ext uri="{BB962C8B-B14F-4D97-AF65-F5344CB8AC3E}">
-        <p14:creationId xmlns:p14="http://schemas.microsoft.com/office/powerpoint/2010/main" val="2685164170"/>
+        <p14:creationId xmlns:p14="http://schemas.microsoft.com/office/powerpoint/2010/main" val="1737998889"/>
       </p:ext>
     </p:extLst>
   </p:cSld>
@@ -1741,7 +1741,7 @@
           <a:p>
             <a:r>
               <a:rPr lang="en-US" dirty="0"/>
-              <a:t>After running this through some list that are hundreds of thousands of items, its time to convert to an array list</a:t>
+              <a:t>The majority of the tests we you are going to write are unit tests.</a:t>
             </a:r>
           </a:p>
         </p:txBody>
@@ -1772,7 +1772,7 @@
     </p:spTree>
     <p:extLst>
       <p:ext uri="{BB962C8B-B14F-4D97-AF65-F5344CB8AC3E}">
-        <p14:creationId xmlns:p14="http://schemas.microsoft.com/office/powerpoint/2010/main" val="1737998889"/>
+        <p14:creationId xmlns:p14="http://schemas.microsoft.com/office/powerpoint/2010/main" val="1362832935"/>
       </p:ext>
     </p:extLst>
   </p:cSld>
@@ -1828,7 +1828,7 @@
           <a:p>
             <a:r>
               <a:rPr lang="en-US" dirty="0"/>
-              <a:t>The majority of the tests we you are going to write are unit tests.</a:t>
+              <a:t>What the heck happens if a property you are trying to search for doesn’t exist?</a:t>
             </a:r>
           </a:p>
         </p:txBody>
@@ -1859,7 +1859,7 @@
     </p:spTree>
     <p:extLst>
       <p:ext uri="{BB962C8B-B14F-4D97-AF65-F5344CB8AC3E}">
-        <p14:creationId xmlns:p14="http://schemas.microsoft.com/office/powerpoint/2010/main" val="1362832935"/>
+        <p14:creationId xmlns:p14="http://schemas.microsoft.com/office/powerpoint/2010/main" val="1892057454"/>
       </p:ext>
     </p:extLst>
   </p:cSld>
@@ -1915,7 +1915,7 @@
           <a:p>
             <a:r>
               <a:rPr lang="en-US" dirty="0"/>
-              <a:t>What the heck happens if a property you are trying to search for doesn’t exist?</a:t>
+              <a:t>The majority of the tests we you are going to write are unit tests.</a:t>
             </a:r>
           </a:p>
         </p:txBody>
@@ -1937,7 +1937,7 @@
           <a:p>
             <a:fld id="{C7B05CAA-7DFD-4456-A943-C499583EE113}" type="slidenum">
               <a:rPr lang="en-US" smtClean="0"/>
-              <a:t>27</a:t>
+              <a:t>28</a:t>
             </a:fld>
             <a:endParaRPr lang="en-US"/>
           </a:p>
@@ -1946,7 +1946,7 @@
     </p:spTree>
     <p:extLst>
       <p:ext uri="{BB962C8B-B14F-4D97-AF65-F5344CB8AC3E}">
-        <p14:creationId xmlns:p14="http://schemas.microsoft.com/office/powerpoint/2010/main" val="1892057454"/>
+        <p14:creationId xmlns:p14="http://schemas.microsoft.com/office/powerpoint/2010/main" val="2335363100"/>
       </p:ext>
     </p:extLst>
   </p:cSld>
@@ -2033,7 +2033,7 @@
     </p:spTree>
     <p:extLst>
       <p:ext uri="{BB962C8B-B14F-4D97-AF65-F5344CB8AC3E}">
-        <p14:creationId xmlns:p14="http://schemas.microsoft.com/office/powerpoint/2010/main" val="2335363100"/>
+        <p14:creationId xmlns:p14="http://schemas.microsoft.com/office/powerpoint/2010/main" val="1248807388"/>
       </p:ext>
     </p:extLst>
   </p:cSld>
@@ -2120,7 +2120,7 @@
     </p:spTree>
     <p:extLst>
       <p:ext uri="{BB962C8B-B14F-4D97-AF65-F5344CB8AC3E}">
-        <p14:creationId xmlns:p14="http://schemas.microsoft.com/office/powerpoint/2010/main" val="1248807388"/>
+        <p14:creationId xmlns:p14="http://schemas.microsoft.com/office/powerpoint/2010/main" val="2750833739"/>
       </p:ext>
     </p:extLst>
   </p:cSld>
@@ -2176,7 +2176,7 @@
           <a:p>
             <a:r>
               <a:rPr lang="en-US" dirty="0"/>
-              <a:t>The majority of the tests we you are going to write are unit tests.</a:t>
+              <a:t>As you continue to grow and mature as a developer you want your base or foundation to be strong.  </a:t>
             </a:r>
           </a:p>
         </p:txBody>
@@ -2198,7 +2198,7 @@
           <a:p>
             <a:fld id="{C7B05CAA-7DFD-4456-A943-C499583EE113}" type="slidenum">
               <a:rPr lang="en-US" smtClean="0"/>
-              <a:t>31</a:t>
+              <a:t>32</a:t>
             </a:fld>
             <a:endParaRPr lang="en-US"/>
           </a:p>
@@ -2207,7 +2207,7 @@
     </p:spTree>
     <p:extLst>
       <p:ext uri="{BB962C8B-B14F-4D97-AF65-F5344CB8AC3E}">
-        <p14:creationId xmlns:p14="http://schemas.microsoft.com/office/powerpoint/2010/main" val="2750833739"/>
+        <p14:creationId xmlns:p14="http://schemas.microsoft.com/office/powerpoint/2010/main" val="133354329"/>
       </p:ext>
     </p:extLst>
   </p:cSld>
@@ -2350,7 +2350,7 @@
           <a:p>
             <a:r>
               <a:rPr lang="en-US" dirty="0"/>
-              <a:t>As you continue to grow and mature as a developer you want your base or foundation to be strong.  </a:t>
+              <a:t>The majority of the tests we you are going to write are unit tests.</a:t>
             </a:r>
           </a:p>
         </p:txBody>
@@ -2381,7 +2381,7 @@
     </p:spTree>
     <p:extLst>
       <p:ext uri="{BB962C8B-B14F-4D97-AF65-F5344CB8AC3E}">
-        <p14:creationId xmlns:p14="http://schemas.microsoft.com/office/powerpoint/2010/main" val="133354329"/>
+        <p14:creationId xmlns:p14="http://schemas.microsoft.com/office/powerpoint/2010/main" val="2044358113"/>
       </p:ext>
     </p:extLst>
   </p:cSld>
@@ -2468,7 +2468,7 @@
     </p:spTree>
     <p:extLst>
       <p:ext uri="{BB962C8B-B14F-4D97-AF65-F5344CB8AC3E}">
-        <p14:creationId xmlns:p14="http://schemas.microsoft.com/office/powerpoint/2010/main" val="2044358113"/>
+        <p14:creationId xmlns:p14="http://schemas.microsoft.com/office/powerpoint/2010/main" val="3950339015"/>
       </p:ext>
     </p:extLst>
   </p:cSld>
@@ -2555,7 +2555,7 @@
     </p:spTree>
     <p:extLst>
       <p:ext uri="{BB962C8B-B14F-4D97-AF65-F5344CB8AC3E}">
-        <p14:creationId xmlns:p14="http://schemas.microsoft.com/office/powerpoint/2010/main" val="3950339015"/>
+        <p14:creationId xmlns:p14="http://schemas.microsoft.com/office/powerpoint/2010/main" val="2866517880"/>
       </p:ext>
     </p:extLst>
   </p:cSld>
@@ -2642,7 +2642,7 @@
     </p:spTree>
     <p:extLst>
       <p:ext uri="{BB962C8B-B14F-4D97-AF65-F5344CB8AC3E}">
-        <p14:creationId xmlns:p14="http://schemas.microsoft.com/office/powerpoint/2010/main" val="2866517880"/>
+        <p14:creationId xmlns:p14="http://schemas.microsoft.com/office/powerpoint/2010/main" val="3055426026"/>
       </p:ext>
     </p:extLst>
   </p:cSld>
@@ -2697,9 +2697,32 @@
           <a:lstStyle/>
           <a:p>
             <a:r>
-              <a:rPr lang="en-US" dirty="0"/>
-              <a:t>The majority of the tests we you are going to write are unit tests.</a:t>
-            </a:r>
+              <a:rPr lang="en-US" dirty="0" err="1"/>
+              <a:t>Gonna</a:t>
+            </a:r>
+            <a:r>
+              <a:rPr lang="en-US" dirty="0"/>
+              <a:t> kick off pester topic with this </a:t>
+            </a:r>
+            <a:r>
+              <a:rPr lang="en-US" dirty="0" err="1"/>
+              <a:t>tid</a:t>
+            </a:r>
+            <a:r>
+              <a:rPr lang="en-US" dirty="0"/>
+              <a:t> bit. Pester loves functions.  Testing functions is way easier than testing non-functions.  More granular, more loosely coupled, easier to maintain, easy to refactor a billion times easier to test.</a:t>
+            </a:r>
+          </a:p>
+          <a:p>
+            <a:r>
+              <a:rPr lang="en-US" dirty="0"/>
+              <a:t>Get used to </a:t>
+            </a:r>
+            <a:r>
+              <a:rPr lang="en-US"/>
+              <a:t>writing functions.</a:t>
+            </a:r>
+            <a:endParaRPr lang="en-US" dirty="0"/>
           </a:p>
         </p:txBody>
       </p:sp>
@@ -2720,7 +2743,7 @@
           <a:p>
             <a:fld id="{C7B05CAA-7DFD-4456-A943-C499583EE113}" type="slidenum">
               <a:rPr lang="en-US" smtClean="0"/>
-              <a:t>10</a:t>
+              <a:t>11</a:t>
             </a:fld>
             <a:endParaRPr lang="en-US"/>
           </a:p>
@@ -2729,7 +2752,7 @@
     </p:spTree>
     <p:extLst>
       <p:ext uri="{BB962C8B-B14F-4D97-AF65-F5344CB8AC3E}">
-        <p14:creationId xmlns:p14="http://schemas.microsoft.com/office/powerpoint/2010/main" val="3055426026"/>
+        <p14:creationId xmlns:p14="http://schemas.microsoft.com/office/powerpoint/2010/main" val="1244052699"/>
       </p:ext>
     </p:extLst>
   </p:cSld>
@@ -2784,32 +2807,9 @@
           <a:lstStyle/>
           <a:p>
             <a:r>
-              <a:rPr lang="en-US" dirty="0" err="1"/>
-              <a:t>Gonna</a:t>
-            </a:r>
-            <a:r>
-              <a:rPr lang="en-US" dirty="0"/>
-              <a:t> kick off pester topic with this </a:t>
-            </a:r>
-            <a:r>
-              <a:rPr lang="en-US" dirty="0" err="1"/>
-              <a:t>tid</a:t>
-            </a:r>
-            <a:r>
-              <a:rPr lang="en-US" dirty="0"/>
-              <a:t> bit. Pester loves functions.  Testing functions is way easier than testing non-functions.  More granular, more loosely coupled, easier to maintain, easy to refactor a billion times easier to test.</a:t>
-            </a:r>
-          </a:p>
-          <a:p>
-            <a:r>
-              <a:rPr lang="en-US" dirty="0"/>
-              <a:t>Get used to </a:t>
-            </a:r>
-            <a:r>
-              <a:rPr lang="en-US"/>
-              <a:t>writing functions.</a:t>
-            </a:r>
-            <a:endParaRPr lang="en-US" dirty="0"/>
+              <a:rPr lang="en-US" dirty="0"/>
+              <a:t>The majority of the tests we you are going to write are unit tests.</a:t>
+            </a:r>
           </a:p>
         </p:txBody>
       </p:sp>
@@ -2839,7 +2839,7 @@
     </p:spTree>
     <p:extLst>
       <p:ext uri="{BB962C8B-B14F-4D97-AF65-F5344CB8AC3E}">
-        <p14:creationId xmlns:p14="http://schemas.microsoft.com/office/powerpoint/2010/main" val="1244052699"/>
+        <p14:creationId xmlns:p14="http://schemas.microsoft.com/office/powerpoint/2010/main" val="1546059689"/>
       </p:ext>
     </p:extLst>
   </p:cSld>
@@ -7417,7 +7417,7 @@
       </p:grpSpPr>
       <p:sp>
         <p:nvSpPr>
-          <p:cNvPr id="2" name="Title 1"/>
+          <p:cNvPr id="4" name="Title 3"/>
           <p:cNvSpPr>
             <a:spLocks noGrp="1"/>
           </p:cNvSpPr>
@@ -7432,19 +7432,19 @@
           <a:p>
             <a:r>
               <a:rPr lang="en-US" dirty="0"/>
-              <a:t>Why Unit Test?</a:t>
-            </a:r>
-          </a:p>
-        </p:txBody>
-      </p:sp>
-      <p:sp>
-        <p:nvSpPr>
-          <p:cNvPr id="3" name="Content Placeholder 2"/>
+              <a:t>Pester</a:t>
+            </a:r>
+          </a:p>
+        </p:txBody>
+      </p:sp>
+      <p:sp>
+        <p:nvSpPr>
+          <p:cNvPr id="5" name="Text Placeholder 4"/>
           <p:cNvSpPr>
             <a:spLocks noGrp="1"/>
           </p:cNvSpPr>
           <p:nvPr>
-            <p:ph idx="1"/>
+            <p:ph type="body" idx="1"/>
           </p:nvPr>
         </p:nvSpPr>
         <p:spPr/>
@@ -7454,65 +7454,15 @@
           <a:p>
             <a:r>
               <a:rPr lang="en-US" dirty="0"/>
-              <a:t>You will find bugs in your code.</a:t>
-            </a:r>
-          </a:p>
-          <a:p>
-            <a:endParaRPr lang="en-US" dirty="0"/>
-          </a:p>
-          <a:p>
-            <a:r>
-              <a:rPr lang="en-US" dirty="0"/>
-              <a:t>It is the only way to self peer review your code.</a:t>
-            </a:r>
-          </a:p>
-          <a:p>
-            <a:endParaRPr lang="en-US" dirty="0"/>
-          </a:p>
-          <a:p>
-            <a:r>
-              <a:rPr lang="en-US" dirty="0"/>
-              <a:t>It separates you from the pack.</a:t>
-            </a:r>
-          </a:p>
-          <a:p>
-            <a:endParaRPr lang="en-US" dirty="0"/>
-          </a:p>
-          <a:p>
-            <a:pPr marL="0" indent="0">
-              <a:buNone/>
-            </a:pPr>
-            <a:endParaRPr lang="en-US" dirty="0">
-              <a:hlinkClick r:id="rId3"/>
-            </a:endParaRPr>
-          </a:p>
-          <a:p>
-            <a:pPr marL="0" indent="0">
-              <a:buNone/>
-            </a:pPr>
-            <a:r>
-              <a:rPr lang="en-US" dirty="0">
-                <a:hlinkClick r:id="rId3"/>
-              </a:rPr>
-              <a:t>http://blog.celerity.com/the-true-cost-of-a-software-bug</a:t>
-            </a:r>
-            <a:endParaRPr lang="en-US" dirty="0"/>
-          </a:p>
-          <a:p>
-            <a:endParaRPr lang="en-US" dirty="0"/>
-          </a:p>
-          <a:p>
-            <a:pPr marL="0" indent="0">
-              <a:buNone/>
-            </a:pPr>
-            <a:endParaRPr lang="en-US" dirty="0"/>
+              <a:t>The part with all the demos.</a:t>
+            </a:r>
           </a:p>
         </p:txBody>
       </p:sp>
     </p:spTree>
     <p:extLst>
       <p:ext uri="{BB962C8B-B14F-4D97-AF65-F5344CB8AC3E}">
-        <p14:creationId xmlns:p14="http://schemas.microsoft.com/office/powerpoint/2010/main" val="2845285745"/>
+        <p14:creationId xmlns:p14="http://schemas.microsoft.com/office/powerpoint/2010/main" val="1759952495"/>
       </p:ext>
     </p:extLst>
   </p:cSld>
@@ -7541,7 +7491,7 @@
       </p:grpSpPr>
       <p:sp>
         <p:nvSpPr>
-          <p:cNvPr id="4" name="Title 3"/>
+          <p:cNvPr id="2" name="Title 1"/>
           <p:cNvSpPr>
             <a:spLocks noGrp="1"/>
           </p:cNvSpPr>
@@ -7556,19 +7506,19 @@
           <a:p>
             <a:r>
               <a:rPr lang="en-US" dirty="0"/>
-              <a:t>Pester</a:t>
-            </a:r>
-          </a:p>
-        </p:txBody>
-      </p:sp>
-      <p:sp>
-        <p:nvSpPr>
-          <p:cNvPr id="5" name="Text Placeholder 4"/>
+              <a:t>PESTER LOVES FUNCTIONS</a:t>
+            </a:r>
+          </a:p>
+        </p:txBody>
+      </p:sp>
+      <p:sp>
+        <p:nvSpPr>
+          <p:cNvPr id="3" name="Content Placeholder 2"/>
           <p:cNvSpPr>
             <a:spLocks noGrp="1"/>
           </p:cNvSpPr>
           <p:nvPr>
-            <p:ph type="body" idx="1"/>
+            <p:ph idx="1"/>
           </p:nvPr>
         </p:nvSpPr>
         <p:spPr/>
@@ -7576,17 +7526,44 @@
           <a:bodyPr/>
           <a:lstStyle/>
           <a:p>
-            <a:r>
-              <a:rPr lang="en-US" dirty="0"/>
-              <a:t>The part with all the demos.</a:t>
-            </a:r>
+            <a:pPr marL="0" indent="0">
+              <a:buNone/>
+            </a:pPr>
+            <a:r>
+              <a:rPr lang="en-US" sz="8000" dirty="0"/>
+              <a:t>PESTER </a:t>
+            </a:r>
+          </a:p>
+          <a:p>
+            <a:pPr marL="0" indent="0">
+              <a:buNone/>
+            </a:pPr>
+            <a:r>
+              <a:rPr lang="en-US" sz="8000" dirty="0"/>
+              <a:t>LOVES </a:t>
+            </a:r>
+          </a:p>
+          <a:p>
+            <a:pPr marL="0" indent="0">
+              <a:buNone/>
+            </a:pPr>
+            <a:r>
+              <a:rPr lang="en-US" sz="8000" dirty="0"/>
+              <a:t>FUNCTIONS</a:t>
+            </a:r>
+          </a:p>
+          <a:p>
+            <a:pPr marL="0" indent="0">
+              <a:buNone/>
+            </a:pPr>
+            <a:endParaRPr lang="en-US" dirty="0"/>
           </a:p>
         </p:txBody>
       </p:sp>
     </p:spTree>
     <p:extLst>
       <p:ext uri="{BB962C8B-B14F-4D97-AF65-F5344CB8AC3E}">
-        <p14:creationId xmlns:p14="http://schemas.microsoft.com/office/powerpoint/2010/main" val="1759952495"/>
+        <p14:creationId xmlns:p14="http://schemas.microsoft.com/office/powerpoint/2010/main" val="811939996"/>
       </p:ext>
     </p:extLst>
   </p:cSld>
@@ -7630,7 +7607,7 @@
           <a:p>
             <a:r>
               <a:rPr lang="en-US" dirty="0"/>
-              <a:t>PESTER LOVES FUNCTIONS</a:t>
+              <a:t>BASIC Pester Components</a:t>
             </a:r>
           </a:p>
         </p:txBody>
@@ -7650,30 +7627,66 @@
           <a:bodyPr/>
           <a:lstStyle/>
           <a:p>
-            <a:pPr marL="0" indent="0">
-              <a:buNone/>
-            </a:pPr>
-            <a:r>
-              <a:rPr lang="en-US" sz="8000" dirty="0"/>
-              <a:t>PESTER </a:t>
-            </a:r>
-          </a:p>
-          <a:p>
-            <a:pPr marL="0" indent="0">
-              <a:buNone/>
-            </a:pPr>
-            <a:r>
-              <a:rPr lang="en-US" sz="8000" dirty="0"/>
-              <a:t>LOVES </a:t>
-            </a:r>
-          </a:p>
-          <a:p>
-            <a:pPr marL="0" indent="0">
-              <a:buNone/>
-            </a:pPr>
-            <a:r>
-              <a:rPr lang="en-US" sz="8000" dirty="0"/>
-              <a:t>FUNCTIONS</a:t>
+            <a:r>
+              <a:rPr lang="en-US" dirty="0"/>
+              <a:t>Describe</a:t>
+            </a:r>
+          </a:p>
+          <a:p>
+            <a:pPr lvl="1"/>
+            <a:r>
+              <a:rPr lang="en-US" dirty="0"/>
+              <a:t>Each Pester starts with a Describe block</a:t>
+            </a:r>
+          </a:p>
+          <a:p>
+            <a:pPr lvl="1"/>
+            <a:endParaRPr lang="en-US" dirty="0"/>
+          </a:p>
+          <a:p>
+            <a:r>
+              <a:rPr lang="en-US" dirty="0"/>
+              <a:t>Context (optional)</a:t>
+            </a:r>
+          </a:p>
+          <a:p>
+            <a:pPr lvl="1"/>
+            <a:r>
+              <a:rPr lang="en-US" dirty="0"/>
+              <a:t>Logical grouping of It blocks.</a:t>
+            </a:r>
+          </a:p>
+          <a:p>
+            <a:endParaRPr lang="en-US" dirty="0"/>
+          </a:p>
+          <a:p>
+            <a:r>
+              <a:rPr lang="en-US" dirty="0"/>
+              <a:t>It</a:t>
+            </a:r>
+          </a:p>
+          <a:p>
+            <a:pPr lvl="1"/>
+            <a:r>
+              <a:rPr lang="en-US" dirty="0"/>
+              <a:t>Validates the results of tests</a:t>
+            </a:r>
+          </a:p>
+          <a:p>
+            <a:pPr lvl="1"/>
+            <a:endParaRPr lang="en-US" dirty="0"/>
+          </a:p>
+          <a:p>
+            <a:r>
+              <a:rPr lang="en-US" dirty="0"/>
+              <a:t>Should</a:t>
+            </a:r>
+          </a:p>
+          <a:p>
+            <a:pPr lvl="1"/>
+            <a:r>
+              <a:rPr lang="en-US" dirty="0"/>
+              <a:t>Assertion of something</a:t>
             </a:r>
           </a:p>
           <a:p>
@@ -7687,7 +7700,7 @@
     </p:spTree>
     <p:extLst>
       <p:ext uri="{BB962C8B-B14F-4D97-AF65-F5344CB8AC3E}">
-        <p14:creationId xmlns:p14="http://schemas.microsoft.com/office/powerpoint/2010/main" val="811939996"/>
+        <p14:creationId xmlns:p14="http://schemas.microsoft.com/office/powerpoint/2010/main" val="2128569982"/>
       </p:ext>
     </p:extLst>
   </p:cSld>
@@ -7716,115 +7729,41 @@
       </p:grpSpPr>
       <p:sp>
         <p:nvSpPr>
-          <p:cNvPr id="2" name="Title 1"/>
+          <p:cNvPr id="7" name="Text Placeholder 6"/>
           <p:cNvSpPr>
             <a:spLocks noGrp="1"/>
           </p:cNvSpPr>
           <p:nvPr>
-            <p:ph type="title"/>
+            <p:ph type="body" idx="1"/>
           </p:nvPr>
         </p:nvSpPr>
         <p:spPr/>
         <p:txBody>
-          <a:bodyPr/>
+          <a:bodyPr>
+            <a:normAutofit/>
+          </a:bodyPr>
           <a:lstStyle/>
           <a:p>
             <a:r>
               <a:rPr lang="en-US" dirty="0"/>
-              <a:t>BASIC Pester Components</a:t>
-            </a:r>
-          </a:p>
-        </p:txBody>
-      </p:sp>
-      <p:sp>
-        <p:nvSpPr>
-          <p:cNvPr id="3" name="Content Placeholder 2"/>
-          <p:cNvSpPr>
-            <a:spLocks noGrp="1"/>
-          </p:cNvSpPr>
-          <p:nvPr>
-            <p:ph idx="1"/>
-          </p:nvPr>
-        </p:nvSpPr>
-        <p:spPr/>
-        <p:txBody>
-          <a:bodyPr/>
-          <a:lstStyle/>
-          <a:p>
-            <a:r>
-              <a:rPr lang="en-US" dirty="0"/>
-              <a:t>Describe</a:t>
-            </a:r>
-          </a:p>
-          <a:p>
-            <a:pPr lvl="1"/>
-            <a:r>
-              <a:rPr lang="en-US" dirty="0"/>
-              <a:t>Each Pester starts with a Describe block</a:t>
-            </a:r>
-          </a:p>
-          <a:p>
-            <a:pPr lvl="1"/>
-            <a:endParaRPr lang="en-US" dirty="0"/>
-          </a:p>
-          <a:p>
-            <a:r>
-              <a:rPr lang="en-US" dirty="0"/>
-              <a:t>Context (optional)</a:t>
-            </a:r>
-          </a:p>
-          <a:p>
-            <a:pPr lvl="1"/>
-            <a:r>
-              <a:rPr lang="en-US" dirty="0"/>
-              <a:t>Logical grouping of It blocks.</a:t>
-            </a:r>
-          </a:p>
-          <a:p>
-            <a:endParaRPr lang="en-US" dirty="0"/>
-          </a:p>
-          <a:p>
-            <a:r>
-              <a:rPr lang="en-US" dirty="0"/>
-              <a:t>It</a:t>
-            </a:r>
-          </a:p>
-          <a:p>
-            <a:pPr lvl="1"/>
-            <a:r>
-              <a:rPr lang="en-US" dirty="0"/>
-              <a:t>Validates the results of tests</a:t>
-            </a:r>
-          </a:p>
-          <a:p>
-            <a:pPr lvl="1"/>
-            <a:endParaRPr lang="en-US" dirty="0"/>
-          </a:p>
-          <a:p>
-            <a:r>
-              <a:rPr lang="en-US" dirty="0"/>
-              <a:t>Should</a:t>
-            </a:r>
-          </a:p>
-          <a:p>
-            <a:pPr lvl="1"/>
-            <a:r>
-              <a:rPr lang="en-US" dirty="0"/>
-              <a:t>Assertion of something</a:t>
-            </a:r>
-          </a:p>
-          <a:p>
-            <a:pPr marL="0" indent="0">
-              <a:buNone/>
-            </a:pPr>
-            <a:endParaRPr lang="en-US" dirty="0"/>
+              <a:t>Simple Script and Test</a:t>
+            </a:r>
+          </a:p>
+          <a:p>
+            <a:r>
+              <a:rPr lang="en-US" sz="1900" dirty="0"/>
+              <a:t>demo1</a:t>
+            </a:r>
+          </a:p>
+          <a:p>
+            <a:endParaRPr lang="en-US" sz="1900" dirty="0"/>
           </a:p>
         </p:txBody>
       </p:sp>
     </p:spTree>
     <p:extLst>
       <p:ext uri="{BB962C8B-B14F-4D97-AF65-F5344CB8AC3E}">
-        <p14:creationId xmlns:p14="http://schemas.microsoft.com/office/powerpoint/2010/main" val="2128569982"/>
+        <p14:creationId xmlns:p14="http://schemas.microsoft.com/office/powerpoint/2010/main" val="3216050713"/>
       </p:ext>
     </p:extLst>
   </p:cSld>
@@ -7870,24 +7809,21 @@
           <a:p>
             <a:r>
               <a:rPr lang="en-US" dirty="0"/>
-              <a:t>Simple Script and Test</a:t>
-            </a:r>
-          </a:p>
-          <a:p>
-            <a:r>
-              <a:rPr lang="en-US" sz="1900" dirty="0"/>
-              <a:t>demo1</a:t>
-            </a:r>
-          </a:p>
-          <a:p>
-            <a:endParaRPr lang="en-US" sz="1900" dirty="0"/>
+              <a:t>More Context</a:t>
+            </a:r>
+          </a:p>
+          <a:p>
+            <a:r>
+              <a:rPr lang="en-US" sz="2200" dirty="0"/>
+              <a:t>demo2 and demo3</a:t>
+            </a:r>
           </a:p>
         </p:txBody>
       </p:sp>
     </p:spTree>
     <p:extLst>
       <p:ext uri="{BB962C8B-B14F-4D97-AF65-F5344CB8AC3E}">
-        <p14:creationId xmlns:p14="http://schemas.microsoft.com/office/powerpoint/2010/main" val="3216050713"/>
+        <p14:creationId xmlns:p14="http://schemas.microsoft.com/office/powerpoint/2010/main" val="1975919253"/>
       </p:ext>
     </p:extLst>
   </p:cSld>
@@ -7916,30 +7852,107 @@
       </p:grpSpPr>
       <p:sp>
         <p:nvSpPr>
-          <p:cNvPr id="7" name="Text Placeholder 6"/>
+          <p:cNvPr id="2" name="Title 1"/>
           <p:cNvSpPr>
             <a:spLocks noGrp="1"/>
           </p:cNvSpPr>
           <p:nvPr>
-            <p:ph type="body" idx="1"/>
+            <p:ph type="title"/>
           </p:nvPr>
         </p:nvSpPr>
         <p:spPr/>
         <p:txBody>
-          <a:bodyPr>
-            <a:normAutofit/>
-          </a:bodyPr>
+          <a:bodyPr/>
           <a:lstStyle/>
           <a:p>
             <a:r>
               <a:rPr lang="en-US" dirty="0"/>
-              <a:t>More Context</a:t>
-            </a:r>
-          </a:p>
-          <a:p>
-            <a:r>
-              <a:rPr lang="en-US" sz="2200" dirty="0"/>
-              <a:t>demo2 and demo3</a:t>
+              <a:t>Testing a module?</a:t>
+            </a:r>
+          </a:p>
+        </p:txBody>
+      </p:sp>
+      <p:sp>
+        <p:nvSpPr>
+          <p:cNvPr id="3" name="Content Placeholder 2"/>
+          <p:cNvSpPr>
+            <a:spLocks noGrp="1"/>
+          </p:cNvSpPr>
+          <p:nvPr>
+            <p:ph idx="1"/>
+          </p:nvPr>
+        </p:nvSpPr>
+        <p:spPr/>
+        <p:txBody>
+          <a:bodyPr/>
+          <a:lstStyle/>
+          <a:p>
+            <a:r>
+              <a:rPr lang="en-US" dirty="0" err="1"/>
+              <a:t>InModuleScope</a:t>
+            </a:r>
+            <a:endParaRPr lang="en-US" dirty="0"/>
+          </a:p>
+          <a:p>
+            <a:pPr lvl="1"/>
+            <a:r>
+              <a:rPr lang="en-US" dirty="0"/>
+              <a:t>Allows testing of internal (non-exported) code of a script module.</a:t>
+            </a:r>
+          </a:p>
+          <a:p>
+            <a:pPr lvl="2"/>
+            <a:r>
+              <a:rPr lang="en-US" dirty="0"/>
+              <a:t>Functions, variables, aliases.</a:t>
+            </a:r>
+          </a:p>
+          <a:p>
+            <a:endParaRPr lang="en-US" dirty="0"/>
+          </a:p>
+          <a:p>
+            <a:r>
+              <a:rPr lang="en-US" dirty="0"/>
+              <a:t>Have a separate test for each </a:t>
+            </a:r>
+            <a:r>
+              <a:rPr lang="en-US" dirty="0" err="1"/>
+              <a:t>CmdLet</a:t>
+            </a:r>
+            <a:endParaRPr lang="en-US" dirty="0"/>
+          </a:p>
+          <a:p>
+            <a:endParaRPr lang="en-US" dirty="0"/>
+          </a:p>
+          <a:p>
+            <a:r>
+              <a:rPr lang="en-US" dirty="0"/>
+              <a:t>Name the Describe block the name of the </a:t>
+            </a:r>
+            <a:r>
+              <a:rPr lang="en-US" dirty="0" err="1"/>
+              <a:t>CmdLet</a:t>
+            </a:r>
+            <a:endParaRPr lang="en-US" dirty="0"/>
+          </a:p>
+          <a:p>
+            <a:pPr lvl="1"/>
+            <a:r>
+              <a:rPr lang="en-US"/>
+              <a:t>Or </a:t>
+            </a:r>
+            <a:r>
+              <a:rPr lang="en-US" dirty="0"/>
+              <a:t>whatever standard you want to use, but have one.</a:t>
+            </a:r>
+          </a:p>
+          <a:p>
+            <a:pPr marL="0" indent="0">
+              <a:buNone/>
+            </a:pPr>
+            <a:r>
+              <a:rPr lang="en-US" dirty="0"/>
+              <a:t>	</a:t>
             </a:r>
           </a:p>
         </p:txBody>
@@ -7947,7 +7960,7 @@
     </p:spTree>
     <p:extLst>
       <p:ext uri="{BB962C8B-B14F-4D97-AF65-F5344CB8AC3E}">
-        <p14:creationId xmlns:p14="http://schemas.microsoft.com/office/powerpoint/2010/main" val="1975919253"/>
+        <p14:creationId xmlns:p14="http://schemas.microsoft.com/office/powerpoint/2010/main" val="3178243777"/>
       </p:ext>
     </p:extLst>
   </p:cSld>
@@ -7976,12 +7989,12 @@
       </p:grpSpPr>
       <p:sp>
         <p:nvSpPr>
-          <p:cNvPr id="2" name="Title 1"/>
+          <p:cNvPr id="7" name="Text Placeholder 6"/>
           <p:cNvSpPr>
             <a:spLocks noGrp="1"/>
           </p:cNvSpPr>
           <p:nvPr>
-            <p:ph type="title"/>
+            <p:ph type="body" idx="1"/>
           </p:nvPr>
         </p:nvSpPr>
         <p:spPr/>
@@ -7991,88 +8004,7 @@
           <a:p>
             <a:r>
               <a:rPr lang="en-US" dirty="0"/>
-              <a:t>Testing a module?</a:t>
-            </a:r>
-          </a:p>
-        </p:txBody>
-      </p:sp>
-      <p:sp>
-        <p:nvSpPr>
-          <p:cNvPr id="3" name="Content Placeholder 2"/>
-          <p:cNvSpPr>
-            <a:spLocks noGrp="1"/>
-          </p:cNvSpPr>
-          <p:nvPr>
-            <p:ph idx="1"/>
-          </p:nvPr>
-        </p:nvSpPr>
-        <p:spPr/>
-        <p:txBody>
-          <a:bodyPr/>
-          <a:lstStyle/>
-          <a:p>
-            <a:r>
-              <a:rPr lang="en-US" dirty="0" err="1"/>
-              <a:t>InModuleScope</a:t>
-            </a:r>
-            <a:endParaRPr lang="en-US" dirty="0"/>
-          </a:p>
-          <a:p>
-            <a:pPr lvl="1"/>
-            <a:r>
-              <a:rPr lang="en-US" dirty="0"/>
-              <a:t>Allows testing of internal (non-exported) code of a script module.</a:t>
-            </a:r>
-          </a:p>
-          <a:p>
-            <a:pPr lvl="2"/>
-            <a:r>
-              <a:rPr lang="en-US" dirty="0"/>
-              <a:t>Functions, variables, aliases.</a:t>
-            </a:r>
-          </a:p>
-          <a:p>
-            <a:endParaRPr lang="en-US" dirty="0"/>
-          </a:p>
-          <a:p>
-            <a:r>
-              <a:rPr lang="en-US" dirty="0"/>
-              <a:t>Have a separate test for each </a:t>
-            </a:r>
-            <a:r>
-              <a:rPr lang="en-US" dirty="0" err="1"/>
-              <a:t>CmdLet</a:t>
-            </a:r>
-            <a:endParaRPr lang="en-US" dirty="0"/>
-          </a:p>
-          <a:p>
-            <a:endParaRPr lang="en-US" dirty="0"/>
-          </a:p>
-          <a:p>
-            <a:r>
-              <a:rPr lang="en-US" dirty="0"/>
-              <a:t>Name the Describe block the name of the </a:t>
-            </a:r>
-            <a:r>
-              <a:rPr lang="en-US" dirty="0" err="1"/>
-              <a:t>CmdLet</a:t>
-            </a:r>
-            <a:endParaRPr lang="en-US" dirty="0"/>
-          </a:p>
-          <a:p>
-            <a:pPr lvl="1"/>
-            <a:r>
-              <a:rPr lang="en-US" dirty="0"/>
-              <a:t>Our whatever standard you want to use, but have one.</a:t>
-            </a:r>
-          </a:p>
-          <a:p>
-            <a:pPr marL="0" indent="0">
-              <a:buNone/>
-            </a:pPr>
-            <a:r>
-              <a:rPr lang="en-US" dirty="0"/>
-              <a:t>	</a:t>
+              <a:t>Module</a:t>
             </a:r>
           </a:p>
         </p:txBody>
@@ -8080,7 +8012,7 @@
     </p:spTree>
     <p:extLst>
       <p:ext uri="{BB962C8B-B14F-4D97-AF65-F5344CB8AC3E}">
-        <p14:creationId xmlns:p14="http://schemas.microsoft.com/office/powerpoint/2010/main" val="3178243777"/>
+        <p14:creationId xmlns:p14="http://schemas.microsoft.com/office/powerpoint/2010/main" val="2970444790"/>
       </p:ext>
     </p:extLst>
   </p:cSld>
@@ -8109,12 +8041,12 @@
       </p:grpSpPr>
       <p:sp>
         <p:nvSpPr>
-          <p:cNvPr id="7" name="Text Placeholder 6"/>
+          <p:cNvPr id="2" name="Title 1"/>
           <p:cNvSpPr>
             <a:spLocks noGrp="1"/>
           </p:cNvSpPr>
           <p:nvPr>
-            <p:ph type="body" idx="1"/>
+            <p:ph type="title"/>
           </p:nvPr>
         </p:nvSpPr>
         <p:spPr/>
@@ -8124,15 +8056,74 @@
           <a:p>
             <a:r>
               <a:rPr lang="en-US" dirty="0"/>
-              <a:t>Module</a:t>
-            </a:r>
+              <a:t>More Pester Components</a:t>
+            </a:r>
+          </a:p>
+        </p:txBody>
+      </p:sp>
+      <p:sp>
+        <p:nvSpPr>
+          <p:cNvPr id="3" name="Content Placeholder 2"/>
+          <p:cNvSpPr>
+            <a:spLocks noGrp="1"/>
+          </p:cNvSpPr>
+          <p:nvPr>
+            <p:ph idx="1"/>
+          </p:nvPr>
+        </p:nvSpPr>
+        <p:spPr/>
+        <p:txBody>
+          <a:bodyPr/>
+          <a:lstStyle/>
+          <a:p>
+            <a:r>
+              <a:rPr lang="en-US" dirty="0"/>
+              <a:t>Mock</a:t>
+            </a:r>
+          </a:p>
+          <a:p>
+            <a:pPr lvl="1"/>
+            <a:r>
+              <a:rPr lang="en-US" dirty="0"/>
+              <a:t>Replacement for existing commands.</a:t>
+            </a:r>
+          </a:p>
+          <a:p>
+            <a:pPr lvl="1"/>
+            <a:r>
+              <a:rPr lang="en-US" dirty="0"/>
+              <a:t>Enforces no interaction with the environment.</a:t>
+            </a:r>
+          </a:p>
+          <a:p>
+            <a:pPr lvl="1"/>
+            <a:endParaRPr lang="en-US" dirty="0"/>
+          </a:p>
+          <a:p>
+            <a:r>
+              <a:rPr lang="en-US" dirty="0"/>
+              <a:t>Assertion</a:t>
+            </a:r>
+          </a:p>
+          <a:p>
+            <a:pPr lvl="1"/>
+            <a:r>
+              <a:rPr lang="en-US" dirty="0"/>
+              <a:t>Ensure things did or did not happen.</a:t>
+            </a:r>
+          </a:p>
+          <a:p>
+            <a:pPr marL="0" indent="0">
+              <a:buNone/>
+            </a:pPr>
+            <a:endParaRPr lang="en-US" dirty="0"/>
           </a:p>
         </p:txBody>
       </p:sp>
     </p:spTree>
     <p:extLst>
       <p:ext uri="{BB962C8B-B14F-4D97-AF65-F5344CB8AC3E}">
-        <p14:creationId xmlns:p14="http://schemas.microsoft.com/office/powerpoint/2010/main" val="2970444790"/>
+        <p14:creationId xmlns:p14="http://schemas.microsoft.com/office/powerpoint/2010/main" val="362101207"/>
       </p:ext>
     </p:extLst>
   </p:cSld>
@@ -8161,89 +8152,38 @@
       </p:grpSpPr>
       <p:sp>
         <p:nvSpPr>
-          <p:cNvPr id="2" name="Title 1"/>
+          <p:cNvPr id="7" name="Text Placeholder 6"/>
           <p:cNvSpPr>
             <a:spLocks noGrp="1"/>
           </p:cNvSpPr>
           <p:nvPr>
-            <p:ph type="title"/>
+            <p:ph type="body" idx="1"/>
           </p:nvPr>
         </p:nvSpPr>
         <p:spPr/>
         <p:txBody>
-          <a:bodyPr/>
+          <a:bodyPr>
+            <a:normAutofit/>
+          </a:bodyPr>
           <a:lstStyle/>
           <a:p>
             <a:r>
               <a:rPr lang="en-US" dirty="0"/>
-              <a:t>More Pester Components</a:t>
-            </a:r>
-          </a:p>
-        </p:txBody>
-      </p:sp>
-      <p:sp>
-        <p:nvSpPr>
-          <p:cNvPr id="3" name="Content Placeholder 2"/>
-          <p:cNvSpPr>
-            <a:spLocks noGrp="1"/>
-          </p:cNvSpPr>
-          <p:nvPr>
-            <p:ph idx="1"/>
-          </p:nvPr>
-        </p:nvSpPr>
-        <p:spPr/>
-        <p:txBody>
-          <a:bodyPr/>
-          <a:lstStyle/>
-          <a:p>
-            <a:r>
-              <a:rPr lang="en-US" dirty="0"/>
-              <a:t>Mock</a:t>
-            </a:r>
-          </a:p>
-          <a:p>
-            <a:pPr lvl="1"/>
-            <a:r>
-              <a:rPr lang="en-US" dirty="0"/>
-              <a:t>Replacement for existing commands.</a:t>
-            </a:r>
-          </a:p>
-          <a:p>
-            <a:pPr lvl="1"/>
-            <a:r>
-              <a:rPr lang="en-US" dirty="0"/>
-              <a:t>Enforces no interaction with the environment.</a:t>
-            </a:r>
-          </a:p>
-          <a:p>
-            <a:pPr lvl="1"/>
-            <a:endParaRPr lang="en-US" dirty="0"/>
-          </a:p>
-          <a:p>
-            <a:r>
-              <a:rPr lang="en-US" dirty="0"/>
-              <a:t>Assertion</a:t>
-            </a:r>
-          </a:p>
-          <a:p>
-            <a:pPr lvl="1"/>
-            <a:r>
-              <a:rPr lang="en-US" dirty="0"/>
-              <a:t>Ensure things did or did not happen.</a:t>
-            </a:r>
-          </a:p>
-          <a:p>
-            <a:pPr marL="0" indent="0">
-              <a:buNone/>
-            </a:pPr>
-            <a:endParaRPr lang="en-US" dirty="0"/>
+              <a:t>Mocks and Assertions</a:t>
+            </a:r>
+          </a:p>
+          <a:p>
+            <a:r>
+              <a:rPr lang="en-US" sz="1900" dirty="0"/>
+              <a:t>demo5</a:t>
+            </a:r>
           </a:p>
         </p:txBody>
       </p:sp>
     </p:spTree>
     <p:extLst>
       <p:ext uri="{BB962C8B-B14F-4D97-AF65-F5344CB8AC3E}">
-        <p14:creationId xmlns:p14="http://schemas.microsoft.com/office/powerpoint/2010/main" val="362101207"/>
+        <p14:creationId xmlns:p14="http://schemas.microsoft.com/office/powerpoint/2010/main" val="3365772388"/>
       </p:ext>
     </p:extLst>
   </p:cSld>
@@ -8272,38 +8212,86 @@
       </p:grpSpPr>
       <p:sp>
         <p:nvSpPr>
-          <p:cNvPr id="7" name="Text Placeholder 6"/>
+          <p:cNvPr id="2" name="Title 1"/>
           <p:cNvSpPr>
             <a:spLocks noGrp="1"/>
           </p:cNvSpPr>
           <p:nvPr>
-            <p:ph type="body" idx="1"/>
+            <p:ph type="title"/>
           </p:nvPr>
         </p:nvSpPr>
         <p:spPr/>
         <p:txBody>
-          <a:bodyPr>
-            <a:normAutofit/>
-          </a:bodyPr>
+          <a:bodyPr/>
           <a:lstStyle/>
           <a:p>
             <a:r>
               <a:rPr lang="en-US" dirty="0"/>
-              <a:t>Mocks and Assertions</a:t>
-            </a:r>
-          </a:p>
-          <a:p>
-            <a:r>
-              <a:rPr lang="en-US" sz="1900" dirty="0"/>
-              <a:t>demo5</a:t>
-            </a:r>
+              <a:t>Parameter Filter</a:t>
+            </a:r>
+          </a:p>
+        </p:txBody>
+      </p:sp>
+      <p:sp>
+        <p:nvSpPr>
+          <p:cNvPr id="3" name="Content Placeholder 2"/>
+          <p:cNvSpPr>
+            <a:spLocks noGrp="1"/>
+          </p:cNvSpPr>
+          <p:nvPr>
+            <p:ph idx="1"/>
+          </p:nvPr>
+        </p:nvSpPr>
+        <p:spPr/>
+        <p:txBody>
+          <a:bodyPr/>
+          <a:lstStyle/>
+          <a:p>
+            <a:r>
+              <a:rPr lang="en-US" dirty="0"/>
+              <a:t>Ensure a specific Mock is called or not.</a:t>
+            </a:r>
+          </a:p>
+          <a:p>
+            <a:endParaRPr lang="en-US" dirty="0"/>
+          </a:p>
+          <a:p>
+            <a:r>
+              <a:rPr lang="en-US" dirty="0"/>
+              <a:t>Ensure a specific Mock was called a certain amount of times.</a:t>
+            </a:r>
+          </a:p>
+          <a:p>
+            <a:endParaRPr lang="en-US" dirty="0"/>
+          </a:p>
+          <a:p>
+            <a:r>
+              <a:rPr lang="en-US" dirty="0"/>
+              <a:t>Ensure a Mock was called in a specific Scope.</a:t>
+            </a:r>
+          </a:p>
+          <a:p>
+            <a:pPr lvl="1"/>
+            <a:endParaRPr lang="en-US" dirty="0"/>
+          </a:p>
+          <a:p>
+            <a:r>
+              <a:rPr lang="en-US" dirty="0"/>
+              <a:t>You can add a parameter filter to a Mock or an Assertion.</a:t>
+            </a:r>
+          </a:p>
+          <a:p>
+            <a:pPr marL="0" indent="0">
+              <a:buNone/>
+            </a:pPr>
+            <a:endParaRPr lang="en-US" dirty="0"/>
           </a:p>
         </p:txBody>
       </p:sp>
     </p:spTree>
     <p:extLst>
       <p:ext uri="{BB962C8B-B14F-4D97-AF65-F5344CB8AC3E}">
-        <p14:creationId xmlns:p14="http://schemas.microsoft.com/office/powerpoint/2010/main" val="3365772388"/>
+        <p14:creationId xmlns:p14="http://schemas.microsoft.com/office/powerpoint/2010/main" val="313055934"/>
       </p:ext>
     </p:extLst>
   </p:cSld>
@@ -8592,12 +8580,12 @@
       </p:grpSpPr>
       <p:sp>
         <p:nvSpPr>
-          <p:cNvPr id="2" name="Title 1"/>
+          <p:cNvPr id="7" name="Text Placeholder 6"/>
           <p:cNvSpPr>
             <a:spLocks noGrp="1"/>
           </p:cNvSpPr>
           <p:nvPr>
-            <p:ph type="title"/>
+            <p:ph type="body" idx="1"/>
           </p:nvPr>
         </p:nvSpPr>
         <p:spPr/>
@@ -8606,64 +8594,9 @@
           <a:lstStyle/>
           <a:p>
             <a:r>
-              <a:rPr lang="en-US" dirty="0"/>
-              <a:t>Parameter Filter</a:t>
-            </a:r>
-          </a:p>
-        </p:txBody>
-      </p:sp>
-      <p:sp>
-        <p:nvSpPr>
-          <p:cNvPr id="3" name="Content Placeholder 2"/>
-          <p:cNvSpPr>
-            <a:spLocks noGrp="1"/>
-          </p:cNvSpPr>
-          <p:nvPr>
-            <p:ph idx="1"/>
-          </p:nvPr>
-        </p:nvSpPr>
-        <p:spPr/>
-        <p:txBody>
-          <a:bodyPr/>
-          <a:lstStyle/>
-          <a:p>
-            <a:r>
-              <a:rPr lang="en-US" dirty="0"/>
-              <a:t>Ensure a specific Mock is called or not.</a:t>
-            </a:r>
-          </a:p>
-          <a:p>
-            <a:endParaRPr lang="en-US" dirty="0"/>
-          </a:p>
-          <a:p>
-            <a:r>
-              <a:rPr lang="en-US" dirty="0"/>
-              <a:t>Ensure a specific Mock was called a certain amount of times.</a:t>
-            </a:r>
-          </a:p>
-          <a:p>
-            <a:endParaRPr lang="en-US" dirty="0"/>
-          </a:p>
-          <a:p>
-            <a:r>
-              <a:rPr lang="en-US" dirty="0"/>
-              <a:t>Ensure a Mock was called in a specific Scope.</a:t>
-            </a:r>
-          </a:p>
-          <a:p>
-            <a:pPr lvl="1"/>
-            <a:endParaRPr lang="en-US" dirty="0"/>
-          </a:p>
-          <a:p>
-            <a:r>
-              <a:rPr lang="en-US" dirty="0"/>
-              <a:t>You can add a parameter filter to a Mock or an Assertion.</a:t>
-            </a:r>
-          </a:p>
-          <a:p>
-            <a:pPr marL="0" indent="0">
-              <a:buNone/>
-            </a:pPr>
+              <a:rPr lang="en-US" dirty="0" err="1"/>
+              <a:t>ParameterFilter</a:t>
+            </a:r>
             <a:endParaRPr lang="en-US" dirty="0"/>
           </a:p>
         </p:txBody>
@@ -8671,7 +8604,7 @@
     </p:spTree>
     <p:extLst>
       <p:ext uri="{BB962C8B-B14F-4D97-AF65-F5344CB8AC3E}">
-        <p14:creationId xmlns:p14="http://schemas.microsoft.com/office/powerpoint/2010/main" val="313055934"/>
+        <p14:creationId xmlns:p14="http://schemas.microsoft.com/office/powerpoint/2010/main" val="4087031927"/>
       </p:ext>
     </p:extLst>
   </p:cSld>
@@ -8700,12 +8633,12 @@
       </p:grpSpPr>
       <p:sp>
         <p:nvSpPr>
-          <p:cNvPr id="7" name="Text Placeholder 6"/>
+          <p:cNvPr id="2" name="Title 1"/>
           <p:cNvSpPr>
             <a:spLocks noGrp="1"/>
           </p:cNvSpPr>
           <p:nvPr>
-            <p:ph type="body" idx="1"/>
+            <p:ph type="title"/>
           </p:nvPr>
         </p:nvSpPr>
         <p:spPr/>
@@ -8714,9 +8647,57 @@
           <a:lstStyle/>
           <a:p>
             <a:r>
-              <a:rPr lang="en-US" dirty="0" err="1"/>
-              <a:t>ParameterFilter</a:t>
-            </a:r>
+              <a:rPr lang="en-US" dirty="0"/>
+              <a:t>REMINDER</a:t>
+            </a:r>
+          </a:p>
+        </p:txBody>
+      </p:sp>
+      <p:sp>
+        <p:nvSpPr>
+          <p:cNvPr id="3" name="Content Placeholder 2"/>
+          <p:cNvSpPr>
+            <a:spLocks noGrp="1"/>
+          </p:cNvSpPr>
+          <p:nvPr>
+            <p:ph idx="1"/>
+          </p:nvPr>
+        </p:nvSpPr>
+        <p:spPr/>
+        <p:txBody>
+          <a:bodyPr/>
+          <a:lstStyle/>
+          <a:p>
+            <a:pPr marL="0" indent="0">
+              <a:buNone/>
+            </a:pPr>
+            <a:r>
+              <a:rPr lang="en-US" sz="8000" dirty="0"/>
+              <a:t>PESTER </a:t>
+            </a:r>
+          </a:p>
+          <a:p>
+            <a:pPr marL="0" indent="0">
+              <a:buNone/>
+            </a:pPr>
+            <a:r>
+              <a:rPr lang="en-US" sz="8000" dirty="0"/>
+              <a:t>LOVES </a:t>
+            </a:r>
+          </a:p>
+          <a:p>
+            <a:pPr marL="0" indent="0">
+              <a:buNone/>
+            </a:pPr>
+            <a:r>
+              <a:rPr lang="en-US" sz="8000" dirty="0"/>
+              <a:t>FUNCTIONS</a:t>
+            </a:r>
+          </a:p>
+          <a:p>
+            <a:pPr marL="0" indent="0">
+              <a:buNone/>
+            </a:pPr>
             <a:endParaRPr lang="en-US" dirty="0"/>
           </a:p>
         </p:txBody>
@@ -8724,7 +8705,7 @@
     </p:spTree>
     <p:extLst>
       <p:ext uri="{BB962C8B-B14F-4D97-AF65-F5344CB8AC3E}">
-        <p14:creationId xmlns:p14="http://schemas.microsoft.com/office/powerpoint/2010/main" val="4087031927"/>
+        <p14:creationId xmlns:p14="http://schemas.microsoft.com/office/powerpoint/2010/main" val="1665913852"/>
       </p:ext>
     </p:extLst>
   </p:cSld>
@@ -8753,79 +8734,32 @@
       </p:grpSpPr>
       <p:sp>
         <p:nvSpPr>
-          <p:cNvPr id="2" name="Title 1"/>
+          <p:cNvPr id="7" name="Text Placeholder 6"/>
           <p:cNvSpPr>
             <a:spLocks noGrp="1"/>
           </p:cNvSpPr>
           <p:nvPr>
-            <p:ph type="title"/>
+            <p:ph type="body" idx="1"/>
           </p:nvPr>
         </p:nvSpPr>
         <p:spPr/>
         <p:txBody>
-          <a:bodyPr/>
+          <a:bodyPr>
+            <a:normAutofit/>
+          </a:bodyPr>
           <a:lstStyle/>
           <a:p>
             <a:r>
               <a:rPr lang="en-US" dirty="0"/>
-              <a:t>REMINDER</a:t>
-            </a:r>
-          </a:p>
-        </p:txBody>
-      </p:sp>
-      <p:sp>
-        <p:nvSpPr>
-          <p:cNvPr id="3" name="Content Placeholder 2"/>
-          <p:cNvSpPr>
-            <a:spLocks noGrp="1"/>
-          </p:cNvSpPr>
-          <p:nvPr>
-            <p:ph idx="1"/>
-          </p:nvPr>
-        </p:nvSpPr>
-        <p:spPr/>
-        <p:txBody>
-          <a:bodyPr/>
-          <a:lstStyle/>
-          <a:p>
-            <a:pPr marL="0" indent="0">
-              <a:buNone/>
-            </a:pPr>
-            <a:r>
-              <a:rPr lang="en-US" sz="8000" dirty="0"/>
-              <a:t>PESTER </a:t>
-            </a:r>
-          </a:p>
-          <a:p>
-            <a:pPr marL="0" indent="0">
-              <a:buNone/>
-            </a:pPr>
-            <a:r>
-              <a:rPr lang="en-US" sz="8000" dirty="0"/>
-              <a:t>LOVES </a:t>
-            </a:r>
-          </a:p>
-          <a:p>
-            <a:pPr marL="0" indent="0">
-              <a:buNone/>
-            </a:pPr>
-            <a:r>
-              <a:rPr lang="en-US" sz="8000" dirty="0"/>
-              <a:t>FUNCTIONS</a:t>
-            </a:r>
-          </a:p>
-          <a:p>
-            <a:pPr marL="0" indent="0">
-              <a:buNone/>
-            </a:pPr>
-            <a:endParaRPr lang="en-US" dirty="0"/>
+              <a:t>Designing Testable Code</a:t>
+            </a:r>
           </a:p>
         </p:txBody>
       </p:sp>
     </p:spTree>
     <p:extLst>
       <p:ext uri="{BB962C8B-B14F-4D97-AF65-F5344CB8AC3E}">
-        <p14:creationId xmlns:p14="http://schemas.microsoft.com/office/powerpoint/2010/main" val="1665913852"/>
+        <p14:creationId xmlns:p14="http://schemas.microsoft.com/office/powerpoint/2010/main" val="42967193"/>
       </p:ext>
     </p:extLst>
   </p:cSld>
@@ -8854,32 +8788,69 @@
       </p:grpSpPr>
       <p:sp>
         <p:nvSpPr>
-          <p:cNvPr id="7" name="Text Placeholder 6"/>
+          <p:cNvPr id="2" name="Title 1"/>
           <p:cNvSpPr>
             <a:spLocks noGrp="1"/>
           </p:cNvSpPr>
           <p:nvPr>
-            <p:ph type="body" idx="1"/>
+            <p:ph type="title"/>
           </p:nvPr>
         </p:nvSpPr>
         <p:spPr/>
         <p:txBody>
-          <a:bodyPr>
-            <a:normAutofit/>
-          </a:bodyPr>
+          <a:bodyPr/>
           <a:lstStyle/>
           <a:p>
             <a:r>
               <a:rPr lang="en-US" dirty="0"/>
-              <a:t>Designing Testable Code</a:t>
-            </a:r>
+              <a:t>Working with .NET methods</a:t>
+            </a:r>
+          </a:p>
+        </p:txBody>
+      </p:sp>
+      <p:sp>
+        <p:nvSpPr>
+          <p:cNvPr id="3" name="Content Placeholder 2"/>
+          <p:cNvSpPr>
+            <a:spLocks noGrp="1"/>
+          </p:cNvSpPr>
+          <p:nvPr>
+            <p:ph idx="1"/>
+          </p:nvPr>
+        </p:nvSpPr>
+        <p:spPr/>
+        <p:txBody>
+          <a:bodyPr/>
+          <a:lstStyle/>
+          <a:p>
+            <a:r>
+              <a:rPr lang="en-US" dirty="0"/>
+              <a:t>Pester cannot mock .NET methods.  </a:t>
+            </a:r>
+          </a:p>
+          <a:p>
+            <a:pPr lvl="1"/>
+            <a:r>
+              <a:rPr lang="en-US" dirty="0"/>
+              <a:t>Be prepared to write functions for each .NET method you need to test.</a:t>
+            </a:r>
+          </a:p>
+          <a:p>
+            <a:pPr lvl="1"/>
+            <a:endParaRPr lang="en-US" dirty="0"/>
+          </a:p>
+          <a:p>
+            <a:pPr marL="0" indent="0">
+              <a:buNone/>
+            </a:pPr>
+            <a:endParaRPr lang="en-US" dirty="0"/>
           </a:p>
         </p:txBody>
       </p:sp>
     </p:spTree>
     <p:extLst>
       <p:ext uri="{BB962C8B-B14F-4D97-AF65-F5344CB8AC3E}">
-        <p14:creationId xmlns:p14="http://schemas.microsoft.com/office/powerpoint/2010/main" val="42967193"/>
+        <p14:creationId xmlns:p14="http://schemas.microsoft.com/office/powerpoint/2010/main" val="1792603981"/>
       </p:ext>
     </p:extLst>
   </p:cSld>
@@ -8908,12 +8879,12 @@
       </p:grpSpPr>
       <p:sp>
         <p:nvSpPr>
-          <p:cNvPr id="2" name="Title 1"/>
+          <p:cNvPr id="7" name="Text Placeholder 6"/>
           <p:cNvSpPr>
             <a:spLocks noGrp="1"/>
           </p:cNvSpPr>
           <p:nvPr>
-            <p:ph type="title"/>
+            <p:ph type="body" idx="1"/>
           </p:nvPr>
         </p:nvSpPr>
         <p:spPr/>
@@ -8923,54 +8894,15 @@
           <a:p>
             <a:r>
               <a:rPr lang="en-US" dirty="0"/>
-              <a:t>Working with .NET methods</a:t>
-            </a:r>
-          </a:p>
-        </p:txBody>
-      </p:sp>
-      <p:sp>
-        <p:nvSpPr>
-          <p:cNvPr id="3" name="Content Placeholder 2"/>
-          <p:cNvSpPr>
-            <a:spLocks noGrp="1"/>
-          </p:cNvSpPr>
-          <p:nvPr>
-            <p:ph idx="1"/>
-          </p:nvPr>
-        </p:nvSpPr>
-        <p:spPr/>
-        <p:txBody>
-          <a:bodyPr/>
-          <a:lstStyle/>
-          <a:p>
-            <a:r>
-              <a:rPr lang="en-US" dirty="0"/>
-              <a:t>Pester cannot mock .NET methods.  </a:t>
-            </a:r>
-          </a:p>
-          <a:p>
-            <a:pPr lvl="1"/>
-            <a:r>
-              <a:rPr lang="en-US" dirty="0"/>
-              <a:t>Be prepared to write functions for each .NET method you need to test.</a:t>
-            </a:r>
-          </a:p>
-          <a:p>
-            <a:pPr lvl="1"/>
-            <a:endParaRPr lang="en-US" dirty="0"/>
-          </a:p>
-          <a:p>
-            <a:pPr marL="0" indent="0">
-              <a:buNone/>
-            </a:pPr>
-            <a:endParaRPr lang="en-US" dirty="0"/>
+              <a:t>.NET Methods</a:t>
+            </a:r>
           </a:p>
         </p:txBody>
       </p:sp>
     </p:spTree>
     <p:extLst>
       <p:ext uri="{BB962C8B-B14F-4D97-AF65-F5344CB8AC3E}">
-        <p14:creationId xmlns:p14="http://schemas.microsoft.com/office/powerpoint/2010/main" val="1792603981"/>
+        <p14:creationId xmlns:p14="http://schemas.microsoft.com/office/powerpoint/2010/main" val="2687243423"/>
       </p:ext>
     </p:extLst>
   </p:cSld>
@@ -8999,12 +8931,12 @@
       </p:grpSpPr>
       <p:sp>
         <p:nvSpPr>
-          <p:cNvPr id="7" name="Text Placeholder 6"/>
+          <p:cNvPr id="2" name="Title 1"/>
           <p:cNvSpPr>
             <a:spLocks noGrp="1"/>
           </p:cNvSpPr>
           <p:nvPr>
-            <p:ph type="body" idx="1"/>
+            <p:ph type="title"/>
           </p:nvPr>
         </p:nvSpPr>
         <p:spPr/>
@@ -9014,15 +8946,100 @@
           <a:p>
             <a:r>
               <a:rPr lang="en-US" dirty="0"/>
-              <a:t>.NET Methods</a:t>
-            </a:r>
+              <a:t>More Pester Components</a:t>
+            </a:r>
+          </a:p>
+        </p:txBody>
+      </p:sp>
+      <p:sp>
+        <p:nvSpPr>
+          <p:cNvPr id="3" name="Content Placeholder 2"/>
+          <p:cNvSpPr>
+            <a:spLocks noGrp="1"/>
+          </p:cNvSpPr>
+          <p:nvPr>
+            <p:ph idx="1"/>
+          </p:nvPr>
+        </p:nvSpPr>
+        <p:spPr/>
+        <p:txBody>
+          <a:bodyPr/>
+          <a:lstStyle/>
+          <a:p>
+            <a:r>
+              <a:rPr lang="en-US" dirty="0"/>
+              <a:t>New-</a:t>
+            </a:r>
+            <a:r>
+              <a:rPr lang="en-US" dirty="0" err="1"/>
+              <a:t>MockObject</a:t>
+            </a:r>
+            <a:endParaRPr lang="en-US" dirty="0"/>
+          </a:p>
+          <a:p>
+            <a:pPr lvl="1"/>
+            <a:r>
+              <a:rPr lang="en-US" dirty="0"/>
+              <a:t>This can create “real” objects of whatever type you need.</a:t>
+            </a:r>
+          </a:p>
+          <a:p>
+            <a:pPr marL="457200" lvl="1" indent="0">
+              <a:buNone/>
+            </a:pPr>
+            <a:endParaRPr lang="en-US" dirty="0"/>
+          </a:p>
+          <a:p>
+            <a:pPr lvl="1"/>
+            <a:r>
+              <a:rPr lang="en-US" dirty="0"/>
+              <a:t>Super useful when needing to return something from a mocked function.</a:t>
+            </a:r>
+          </a:p>
+          <a:p>
+            <a:pPr lvl="1"/>
+            <a:endParaRPr lang="en-US" dirty="0"/>
+          </a:p>
+          <a:p>
+            <a:pPr lvl="1"/>
+            <a:r>
+              <a:rPr lang="en-US" dirty="0"/>
+              <a:t>You need a modern version of Pester for this.</a:t>
+            </a:r>
+          </a:p>
+          <a:p>
+            <a:endParaRPr lang="en-US" dirty="0"/>
+          </a:p>
+          <a:p>
+            <a:r>
+              <a:rPr lang="en-US" dirty="0" err="1"/>
+              <a:t>TestCases</a:t>
+            </a:r>
+            <a:endParaRPr lang="en-US" dirty="0"/>
+          </a:p>
+          <a:p>
+            <a:pPr lvl="1"/>
+            <a:r>
+              <a:rPr lang="en-US" dirty="0"/>
+              <a:t>Pass in an array of parameters to an It block to test multiple “like” scenarios.</a:t>
+            </a:r>
+          </a:p>
+          <a:p>
+            <a:pPr lvl="1"/>
+            <a:endParaRPr lang="en-US" dirty="0"/>
+          </a:p>
+          <a:p>
+            <a:pPr marL="0" indent="0">
+              <a:buNone/>
+            </a:pPr>
+            <a:endParaRPr lang="en-US" dirty="0"/>
           </a:p>
         </p:txBody>
       </p:sp>
     </p:spTree>
     <p:extLst>
       <p:ext uri="{BB962C8B-B14F-4D97-AF65-F5344CB8AC3E}">
-        <p14:creationId xmlns:p14="http://schemas.microsoft.com/office/powerpoint/2010/main" val="2687243423"/>
+        <p14:creationId xmlns:p14="http://schemas.microsoft.com/office/powerpoint/2010/main" val="1273142871"/>
       </p:ext>
     </p:extLst>
   </p:cSld>
@@ -9051,39 +9068,19 @@
       </p:grpSpPr>
       <p:sp>
         <p:nvSpPr>
-          <p:cNvPr id="2" name="Title 1"/>
+          <p:cNvPr id="7" name="Text Placeholder 6"/>
           <p:cNvSpPr>
             <a:spLocks noGrp="1"/>
           </p:cNvSpPr>
           <p:nvPr>
-            <p:ph type="title"/>
+            <p:ph type="body" idx="1"/>
           </p:nvPr>
         </p:nvSpPr>
         <p:spPr/>
         <p:txBody>
-          <a:bodyPr/>
-          <a:lstStyle/>
-          <a:p>
-            <a:r>
-              <a:rPr lang="en-US" dirty="0"/>
-              <a:t>More Pester Components</a:t>
-            </a:r>
-          </a:p>
-        </p:txBody>
-      </p:sp>
-      <p:sp>
-        <p:nvSpPr>
-          <p:cNvPr id="3" name="Content Placeholder 2"/>
-          <p:cNvSpPr>
-            <a:spLocks noGrp="1"/>
-          </p:cNvSpPr>
-          <p:nvPr>
-            <p:ph idx="1"/>
-          </p:nvPr>
-        </p:nvSpPr>
-        <p:spPr/>
-        <p:txBody>
-          <a:bodyPr/>
+          <a:bodyPr>
+            <a:normAutofit/>
+          </a:bodyPr>
           <a:lstStyle/>
           <a:p>
             <a:r>
@@ -9094,64 +9091,6 @@
               <a:rPr lang="en-US" dirty="0" err="1"/>
               <a:t>MockObject</a:t>
             </a:r>
-            <a:endParaRPr lang="en-US" dirty="0"/>
-          </a:p>
-          <a:p>
-            <a:pPr lvl="1"/>
-            <a:r>
-              <a:rPr lang="en-US" dirty="0"/>
-              <a:t>This can create “real” objects of whatever type you need.</a:t>
-            </a:r>
-          </a:p>
-          <a:p>
-            <a:pPr marL="457200" lvl="1" indent="0">
-              <a:buNone/>
-            </a:pPr>
-            <a:endParaRPr lang="en-US" dirty="0"/>
-          </a:p>
-          <a:p>
-            <a:pPr lvl="1"/>
-            <a:r>
-              <a:rPr lang="en-US" dirty="0"/>
-              <a:t>Super useful when needing to return something from a mocked function.</a:t>
-            </a:r>
-          </a:p>
-          <a:p>
-            <a:pPr lvl="1"/>
-            <a:endParaRPr lang="en-US" dirty="0"/>
-          </a:p>
-          <a:p>
-            <a:pPr lvl="1"/>
-            <a:r>
-              <a:rPr lang="en-US" dirty="0"/>
-              <a:t>You need a modern version of Pester for this.</a:t>
-            </a:r>
-          </a:p>
-          <a:p>
-            <a:endParaRPr lang="en-US" dirty="0"/>
-          </a:p>
-          <a:p>
-            <a:r>
-              <a:rPr lang="en-US" dirty="0" err="1"/>
-              <a:t>TestCases</a:t>
-            </a:r>
-            <a:endParaRPr lang="en-US" dirty="0"/>
-          </a:p>
-          <a:p>
-            <a:pPr lvl="1"/>
-            <a:r>
-              <a:rPr lang="en-US" dirty="0"/>
-              <a:t>Pass in an array of parameters to an It block to test multiple “like” scenarios.</a:t>
-            </a:r>
-          </a:p>
-          <a:p>
-            <a:pPr lvl="1"/>
-            <a:endParaRPr lang="en-US" dirty="0"/>
-          </a:p>
-          <a:p>
-            <a:pPr marL="0" indent="0">
-              <a:buNone/>
-            </a:pPr>
             <a:endParaRPr lang="en-US" dirty="0"/>
           </a:p>
         </p:txBody>
@@ -9159,7 +9098,7 @@
     </p:spTree>
     <p:extLst>
       <p:ext uri="{BB962C8B-B14F-4D97-AF65-F5344CB8AC3E}">
-        <p14:creationId xmlns:p14="http://schemas.microsoft.com/office/powerpoint/2010/main" val="1273142871"/>
+        <p14:creationId xmlns:p14="http://schemas.microsoft.com/office/powerpoint/2010/main" val="2846661828"/>
       </p:ext>
     </p:extLst>
   </p:cSld>
@@ -9198,27 +9137,20 @@
         </p:nvSpPr>
         <p:spPr/>
         <p:txBody>
-          <a:bodyPr>
-            <a:normAutofit/>
-          </a:bodyPr>
+          <a:bodyPr/>
           <a:lstStyle/>
           <a:p>
             <a:r>
               <a:rPr lang="en-US" dirty="0"/>
-              <a:t>New-</a:t>
-            </a:r>
-            <a:r>
-              <a:rPr lang="en-US" dirty="0" err="1"/>
-              <a:t>MockObject</a:t>
-            </a:r>
-            <a:endParaRPr lang="en-US" dirty="0"/>
+              <a:t>Test Cases</a:t>
+            </a:r>
           </a:p>
         </p:txBody>
       </p:sp>
     </p:spTree>
     <p:extLst>
       <p:ext uri="{BB962C8B-B14F-4D97-AF65-F5344CB8AC3E}">
-        <p14:creationId xmlns:p14="http://schemas.microsoft.com/office/powerpoint/2010/main" val="2846661828"/>
+        <p14:creationId xmlns:p14="http://schemas.microsoft.com/office/powerpoint/2010/main" val="1053216645"/>
       </p:ext>
     </p:extLst>
   </p:cSld>
@@ -9247,12 +9179,12 @@
       </p:grpSpPr>
       <p:sp>
         <p:nvSpPr>
-          <p:cNvPr id="7" name="Text Placeholder 6"/>
+          <p:cNvPr id="2" name="Title 1"/>
           <p:cNvSpPr>
             <a:spLocks noGrp="1"/>
           </p:cNvSpPr>
           <p:nvPr>
-            <p:ph type="body" idx="1"/>
+            <p:ph type="title"/>
           </p:nvPr>
         </p:nvSpPr>
         <p:spPr/>
@@ -9262,15 +9194,73 @@
           <a:p>
             <a:r>
               <a:rPr lang="en-US" dirty="0"/>
-              <a:t>Test Cases</a:t>
-            </a:r>
+              <a:t>Pester Myths</a:t>
+            </a:r>
+          </a:p>
+        </p:txBody>
+      </p:sp>
+      <p:sp>
+        <p:nvSpPr>
+          <p:cNvPr id="3" name="Content Placeholder 2"/>
+          <p:cNvSpPr>
+            <a:spLocks noGrp="1"/>
+          </p:cNvSpPr>
+          <p:nvPr>
+            <p:ph idx="1"/>
+          </p:nvPr>
+        </p:nvSpPr>
+        <p:spPr/>
+        <p:txBody>
+          <a:bodyPr/>
+          <a:lstStyle/>
+          <a:p>
+            <a:r>
+              <a:rPr lang="en-US" dirty="0"/>
+              <a:t>Pester is not for single developers.</a:t>
+            </a:r>
+          </a:p>
+          <a:p>
+            <a:endParaRPr lang="en-US" dirty="0"/>
+          </a:p>
+          <a:p>
+            <a:r>
+              <a:rPr lang="en-US" dirty="0"/>
+              <a:t>It is only for modules.</a:t>
+            </a:r>
+          </a:p>
+          <a:p>
+            <a:endParaRPr lang="en-US" dirty="0"/>
+          </a:p>
+          <a:p>
+            <a:r>
+              <a:rPr lang="en-US" dirty="0"/>
+              <a:t>Somethings are not testable.</a:t>
+            </a:r>
+          </a:p>
+          <a:p>
+            <a:endParaRPr lang="en-US" dirty="0"/>
+          </a:p>
+          <a:p>
+            <a:r>
+              <a:rPr lang="en-US" dirty="0"/>
+              <a:t>I don’t have the time. Or it is not worth the time.</a:t>
+            </a:r>
+          </a:p>
+          <a:p>
+            <a:endParaRPr lang="en-US" dirty="0"/>
+          </a:p>
+          <a:p>
+            <a:pPr marL="0" indent="0">
+              <a:buNone/>
+            </a:pPr>
+            <a:endParaRPr lang="en-US" dirty="0"/>
           </a:p>
         </p:txBody>
       </p:sp>
     </p:spTree>
     <p:extLst>
       <p:ext uri="{BB962C8B-B14F-4D97-AF65-F5344CB8AC3E}">
-        <p14:creationId xmlns:p14="http://schemas.microsoft.com/office/powerpoint/2010/main" val="1053216645"/>
+        <p14:creationId xmlns:p14="http://schemas.microsoft.com/office/powerpoint/2010/main" val="2006385791"/>
       </p:ext>
     </p:extLst>
   </p:cSld>
@@ -9314,7 +9304,7 @@
           <a:p>
             <a:r>
               <a:rPr lang="en-US" dirty="0"/>
-              <a:t>Pester Myths</a:t>
+              <a:t>Designing For Pester</a:t>
             </a:r>
           </a:p>
         </p:txBody>
@@ -9336,7 +9326,7 @@
           <a:p>
             <a:r>
               <a:rPr lang="en-US" dirty="0"/>
-              <a:t>Pester is not for single developers.</a:t>
+              <a:t>Pester works best with Functions</a:t>
             </a:r>
           </a:p>
           <a:p>
@@ -9345,7 +9335,14 @@
           <a:p>
             <a:r>
               <a:rPr lang="en-US" dirty="0"/>
-              <a:t>It is only for modules.</a:t>
+              <a:t>Functions should write to the pipeline.</a:t>
+            </a:r>
+          </a:p>
+          <a:p>
+            <a:pPr lvl="1"/>
+            <a:r>
+              <a:rPr lang="en-US" dirty="0"/>
+              <a:t>Not write-host</a:t>
             </a:r>
           </a:p>
           <a:p>
@@ -9354,7 +9351,7 @@
           <a:p>
             <a:r>
               <a:rPr lang="en-US" dirty="0"/>
-              <a:t>Somethings are not testable.</a:t>
+              <a:t>Functions should return one and only type of thing.</a:t>
             </a:r>
           </a:p>
           <a:p>
@@ -9363,11 +9360,17 @@
           <a:p>
             <a:r>
               <a:rPr lang="en-US" dirty="0"/>
-              <a:t>I don’t have the time. Or it is not worth the time.</a:t>
+              <a:t>Wrap your .NET Calls</a:t>
             </a:r>
           </a:p>
           <a:p>
             <a:endParaRPr lang="en-US" dirty="0"/>
+          </a:p>
+          <a:p>
+            <a:r>
+              <a:rPr lang="en-US" dirty="0"/>
+              <a:t>Loosely coupled code</a:t>
+            </a:r>
           </a:p>
           <a:p>
             <a:pPr marL="0" indent="0">
@@ -9375,12 +9378,18 @@
             </a:pPr>
             <a:endParaRPr lang="en-US" dirty="0"/>
           </a:p>
+          <a:p>
+            <a:pPr marL="0" indent="0">
+              <a:buNone/>
+            </a:pPr>
+            <a:endParaRPr lang="en-US" dirty="0"/>
+          </a:p>
         </p:txBody>
       </p:sp>
     </p:spTree>
     <p:extLst>
       <p:ext uri="{BB962C8B-B14F-4D97-AF65-F5344CB8AC3E}">
-        <p14:creationId xmlns:p14="http://schemas.microsoft.com/office/powerpoint/2010/main" val="2006385791"/>
+        <p14:creationId xmlns:p14="http://schemas.microsoft.com/office/powerpoint/2010/main" val="3055665544"/>
       </p:ext>
     </p:extLst>
   </p:cSld>
@@ -9547,7 +9556,7 @@
           <a:p>
             <a:r>
               <a:rPr lang="en-US" dirty="0"/>
-              <a:t>Designing For Pester</a:t>
+              <a:t>Tips for Pester</a:t>
             </a:r>
           </a:p>
         </p:txBody>
@@ -9569,7 +9578,7 @@
           <a:p>
             <a:r>
               <a:rPr lang="en-US" dirty="0"/>
-              <a:t>Pester works best with Functions</a:t>
+              <a:t>Write your tests first.  (TDD)</a:t>
             </a:r>
           </a:p>
           <a:p>
@@ -9578,41 +9587,32 @@
           <a:p>
             <a:r>
               <a:rPr lang="en-US" dirty="0"/>
-              <a:t>Functions should write to the pipeline.</a:t>
+              <a:t>Test output</a:t>
+            </a:r>
+          </a:p>
+          <a:p>
+            <a:endParaRPr lang="en-US" dirty="0"/>
+          </a:p>
+          <a:p>
+            <a:r>
+              <a:rPr lang="en-US" dirty="0"/>
+              <a:t>Automate when possible</a:t>
+            </a:r>
+          </a:p>
+          <a:p>
+            <a:endParaRPr lang="en-US" dirty="0"/>
+          </a:p>
+          <a:p>
+            <a:r>
+              <a:rPr lang="en-US" dirty="0"/>
+              <a:t>Test negative assertions</a:t>
             </a:r>
           </a:p>
           <a:p>
             <a:pPr lvl="1"/>
             <a:r>
               <a:rPr lang="en-US" dirty="0"/>
-              <a:t>Not write-host</a:t>
-            </a:r>
-          </a:p>
-          <a:p>
-            <a:endParaRPr lang="en-US" dirty="0"/>
-          </a:p>
-          <a:p>
-            <a:r>
-              <a:rPr lang="en-US" dirty="0"/>
-              <a:t>Functions should return one and only type of thing.</a:t>
-            </a:r>
-          </a:p>
-          <a:p>
-            <a:endParaRPr lang="en-US" dirty="0"/>
-          </a:p>
-          <a:p>
-            <a:r>
-              <a:rPr lang="en-US" dirty="0"/>
-              <a:t>Wrap your .NET Calls</a:t>
-            </a:r>
-          </a:p>
-          <a:p>
-            <a:endParaRPr lang="en-US" dirty="0"/>
-          </a:p>
-          <a:p>
-            <a:r>
-              <a:rPr lang="en-US" dirty="0"/>
-              <a:t>Loosely coupled code</a:t>
+              <a:t>Should Not</a:t>
             </a:r>
           </a:p>
           <a:p>
@@ -9621,18 +9621,12 @@
             </a:pPr>
             <a:endParaRPr lang="en-US" dirty="0"/>
           </a:p>
-          <a:p>
-            <a:pPr marL="0" indent="0">
-              <a:buNone/>
-            </a:pPr>
-            <a:endParaRPr lang="en-US" dirty="0"/>
-          </a:p>
         </p:txBody>
       </p:sp>
     </p:spTree>
     <p:extLst>
       <p:ext uri="{BB962C8B-B14F-4D97-AF65-F5344CB8AC3E}">
-        <p14:creationId xmlns:p14="http://schemas.microsoft.com/office/powerpoint/2010/main" val="3055665544"/>
+        <p14:creationId xmlns:p14="http://schemas.microsoft.com/office/powerpoint/2010/main" val="3805968967"/>
       </p:ext>
     </p:extLst>
   </p:cSld>
@@ -9643,6 +9637,96 @@
 </file>
 
 <file path=ppt/slides/slide31.xml><?xml version="1.0" encoding="utf-8"?>
+<p:sld xmlns:a="http://schemas.openxmlformats.org/drawingml/2006/main" xmlns:r="http://schemas.openxmlformats.org/officeDocument/2006/relationships" xmlns:p="http://schemas.openxmlformats.org/presentationml/2006/main" show="0">
+  <p:cSld>
+    <p:spTree>
+      <p:nvGrpSpPr>
+        <p:cNvPr id="1" name=""/>
+        <p:cNvGrpSpPr/>
+        <p:nvPr/>
+      </p:nvGrpSpPr>
+      <p:grpSpPr>
+        <a:xfrm>
+          <a:off x="0" y="0"/>
+          <a:ext cx="0" cy="0"/>
+          <a:chOff x="0" y="0"/>
+          <a:chExt cx="0" cy="0"/>
+        </a:xfrm>
+      </p:grpSpPr>
+      <p:sp>
+        <p:nvSpPr>
+          <p:cNvPr id="12" name="Title 11"/>
+          <p:cNvSpPr>
+            <a:spLocks noGrp="1"/>
+          </p:cNvSpPr>
+          <p:nvPr>
+            <p:ph type="title"/>
+          </p:nvPr>
+        </p:nvSpPr>
+        <p:spPr/>
+        <p:txBody>
+          <a:bodyPr/>
+          <a:lstStyle/>
+          <a:p>
+            <a:r>
+              <a:rPr lang="en-US" dirty="0"/>
+              <a:t>Presentation</a:t>
+            </a:r>
+          </a:p>
+        </p:txBody>
+      </p:sp>
+      <p:sp>
+        <p:nvSpPr>
+          <p:cNvPr id="13" name="Content Placeholder 12"/>
+          <p:cNvSpPr>
+            <a:spLocks noGrp="1"/>
+          </p:cNvSpPr>
+          <p:nvPr>
+            <p:ph idx="1"/>
+          </p:nvPr>
+        </p:nvSpPr>
+        <p:spPr/>
+        <p:txBody>
+          <a:bodyPr/>
+          <a:lstStyle/>
+          <a:p>
+            <a:r>
+              <a:rPr lang="en-US" dirty="0"/>
+              <a:t>Just a placeholder slide. Please use the example slides in the “Example Slides” Section.</a:t>
+            </a:r>
+          </a:p>
+          <a:p>
+            <a:r>
+              <a:rPr lang="en-US" dirty="0"/>
+              <a:t>Questions? </a:t>
+            </a:r>
+            <a:r>
+              <a:rPr lang="en-US" dirty="0">
+                <a:hlinkClick r:id="rId2"/>
+              </a:rPr>
+              <a:t>info@mnscug.org</a:t>
+            </a:r>
+            <a:endParaRPr lang="en-US" dirty="0"/>
+          </a:p>
+          <a:p>
+            <a:endParaRPr lang="en-US" dirty="0"/>
+          </a:p>
+        </p:txBody>
+      </p:sp>
+    </p:spTree>
+    <p:extLst>
+      <p:ext uri="{BB962C8B-B14F-4D97-AF65-F5344CB8AC3E}">
+        <p14:creationId xmlns:p14="http://schemas.microsoft.com/office/powerpoint/2010/main" val="2333710554"/>
+      </p:ext>
+    </p:extLst>
+  </p:cSld>
+  <p:clrMapOvr>
+    <a:masterClrMapping/>
+  </p:clrMapOvr>
+</p:sld>
+</file>
+
+<file path=ppt/slides/slide32.xml><?xml version="1.0" encoding="utf-8"?>
 <p:sld xmlns:a="http://schemas.openxmlformats.org/drawingml/2006/main" xmlns:r="http://schemas.openxmlformats.org/officeDocument/2006/relationships" xmlns:p="http://schemas.openxmlformats.org/presentationml/2006/main">
   <p:cSld>
     <p:spTree>
@@ -9676,167 +9760,65 @@
           <a:p>
             <a:r>
               <a:rPr lang="en-US" dirty="0"/>
-              <a:t>Tips for Pester</a:t>
-            </a:r>
-          </a:p>
-        </p:txBody>
-      </p:sp>
-      <p:sp>
-        <p:nvSpPr>
-          <p:cNvPr id="3" name="Content Placeholder 2"/>
-          <p:cNvSpPr>
-            <a:spLocks noGrp="1"/>
-          </p:cNvSpPr>
+              <a:t>The Pester Book</a:t>
+            </a:r>
+          </a:p>
+        </p:txBody>
+      </p:sp>
+      <p:pic>
+        <p:nvPicPr>
+          <p:cNvPr id="1026" name="Picture 2" descr="The Pester Book">
+            <a:hlinkClick r:id="rId3"/>
+            <a:extLst>
+              <a:ext uri="{FF2B5EF4-FFF2-40B4-BE49-F238E27FC236}">
+                <a16:creationId xmlns:a16="http://schemas.microsoft.com/office/drawing/2014/main" id="{356CEACA-38F7-4E28-A055-5BA2F89F62BB}"/>
+              </a:ext>
+            </a:extLst>
+          </p:cNvPr>
+          <p:cNvPicPr>
+            <a:picLocks noGrp="1" noChangeAspect="1" noChangeArrowheads="1"/>
+          </p:cNvPicPr>
           <p:nvPr>
             <p:ph idx="1"/>
           </p:nvPr>
-        </p:nvSpPr>
-        <p:spPr/>
-        <p:txBody>
-          <a:bodyPr/>
-          <a:lstStyle/>
-          <a:p>
-            <a:r>
-              <a:rPr lang="en-US" dirty="0"/>
-              <a:t>Write your tests first.  (TDD)</a:t>
-            </a:r>
-          </a:p>
-          <a:p>
-            <a:endParaRPr lang="en-US" dirty="0"/>
-          </a:p>
-          <a:p>
-            <a:r>
-              <a:rPr lang="en-US" dirty="0"/>
-              <a:t>Test output</a:t>
-            </a:r>
-          </a:p>
-          <a:p>
-            <a:endParaRPr lang="en-US" dirty="0"/>
-          </a:p>
-          <a:p>
-            <a:r>
-              <a:rPr lang="en-US" dirty="0"/>
-              <a:t>Automate when possible</a:t>
-            </a:r>
-          </a:p>
-          <a:p>
-            <a:endParaRPr lang="en-US" dirty="0"/>
-          </a:p>
-          <a:p>
-            <a:r>
-              <a:rPr lang="en-US" dirty="0"/>
-              <a:t>Test negative assertions</a:t>
-            </a:r>
-          </a:p>
-          <a:p>
-            <a:pPr lvl="1"/>
-            <a:r>
-              <a:rPr lang="en-US" dirty="0"/>
-              <a:t>Should Not</a:t>
-            </a:r>
-          </a:p>
-          <a:p>
-            <a:pPr marL="0" indent="0">
-              <a:buNone/>
-            </a:pPr>
-            <a:endParaRPr lang="en-US" dirty="0"/>
-          </a:p>
-        </p:txBody>
-      </p:sp>
+        </p:nvPicPr>
+        <p:blipFill>
+          <a:blip r:embed="rId4">
+            <a:extLst>
+              <a:ext uri="{28A0092B-C50C-407E-A947-70E740481C1C}">
+                <a14:useLocalDpi xmlns:a14="http://schemas.microsoft.com/office/drawing/2010/main" val="0"/>
+              </a:ext>
+            </a:extLst>
+          </a:blip>
+          <a:srcRect/>
+          <a:stretch>
+            <a:fillRect/>
+          </a:stretch>
+        </p:blipFill>
+        <p:spPr bwMode="auto">
+          <a:xfrm>
+            <a:off x="4294649" y="1257300"/>
+            <a:ext cx="3602701" cy="4800600"/>
+          </a:xfrm>
+          <a:prstGeom prst="rect">
+            <a:avLst/>
+          </a:prstGeom>
+          <a:noFill/>
+          <a:extLst>
+            <a:ext uri="{909E8E84-426E-40DD-AFC4-6F175D3DCCD1}">
+              <a14:hiddenFill xmlns:a14="http://schemas.microsoft.com/office/drawing/2010/main">
+                <a:solidFill>
+                  <a:srgbClr val="FFFFFF"/>
+                </a:solidFill>
+              </a14:hiddenFill>
+            </a:ext>
+          </a:extLst>
+        </p:spPr>
+      </p:pic>
     </p:spTree>
     <p:extLst>
       <p:ext uri="{BB962C8B-B14F-4D97-AF65-F5344CB8AC3E}">
-        <p14:creationId xmlns:p14="http://schemas.microsoft.com/office/powerpoint/2010/main" val="3805968967"/>
-      </p:ext>
-    </p:extLst>
-  </p:cSld>
-  <p:clrMapOvr>
-    <a:masterClrMapping/>
-  </p:clrMapOvr>
-</p:sld>
-</file>
-
-<file path=ppt/slides/slide32.xml><?xml version="1.0" encoding="utf-8"?>
-<p:sld xmlns:a="http://schemas.openxmlformats.org/drawingml/2006/main" xmlns:r="http://schemas.openxmlformats.org/officeDocument/2006/relationships" xmlns:p="http://schemas.openxmlformats.org/presentationml/2006/main" show="0">
-  <p:cSld>
-    <p:spTree>
-      <p:nvGrpSpPr>
-        <p:cNvPr id="1" name=""/>
-        <p:cNvGrpSpPr/>
-        <p:nvPr/>
-      </p:nvGrpSpPr>
-      <p:grpSpPr>
-        <a:xfrm>
-          <a:off x="0" y="0"/>
-          <a:ext cx="0" cy="0"/>
-          <a:chOff x="0" y="0"/>
-          <a:chExt cx="0" cy="0"/>
-        </a:xfrm>
-      </p:grpSpPr>
-      <p:sp>
-        <p:nvSpPr>
-          <p:cNvPr id="12" name="Title 11"/>
-          <p:cNvSpPr>
-            <a:spLocks noGrp="1"/>
-          </p:cNvSpPr>
-          <p:nvPr>
-            <p:ph type="title"/>
-          </p:nvPr>
-        </p:nvSpPr>
-        <p:spPr/>
-        <p:txBody>
-          <a:bodyPr/>
-          <a:lstStyle/>
-          <a:p>
-            <a:r>
-              <a:rPr lang="en-US" dirty="0"/>
-              <a:t>Presentation</a:t>
-            </a:r>
-          </a:p>
-        </p:txBody>
-      </p:sp>
-      <p:sp>
-        <p:nvSpPr>
-          <p:cNvPr id="13" name="Content Placeholder 12"/>
-          <p:cNvSpPr>
-            <a:spLocks noGrp="1"/>
-          </p:cNvSpPr>
-          <p:nvPr>
-            <p:ph idx="1"/>
-          </p:nvPr>
-        </p:nvSpPr>
-        <p:spPr/>
-        <p:txBody>
-          <a:bodyPr/>
-          <a:lstStyle/>
-          <a:p>
-            <a:r>
-              <a:rPr lang="en-US" dirty="0"/>
-              <a:t>Just a placeholder slide. Please use the example slides in the “Example Slides” Section.</a:t>
-            </a:r>
-          </a:p>
-          <a:p>
-            <a:r>
-              <a:rPr lang="en-US" dirty="0"/>
-              <a:t>Questions? </a:t>
-            </a:r>
-            <a:r>
-              <a:rPr lang="en-US" dirty="0">
-                <a:hlinkClick r:id="rId2"/>
-              </a:rPr>
-              <a:t>info@mnscug.org</a:t>
-            </a:r>
-            <a:endParaRPr lang="en-US" dirty="0"/>
-          </a:p>
-          <a:p>
-            <a:endParaRPr lang="en-US" dirty="0"/>
-          </a:p>
-        </p:txBody>
-      </p:sp>
-    </p:spTree>
-    <p:extLst>
-      <p:ext uri="{BB962C8B-B14F-4D97-AF65-F5344CB8AC3E}">
-        <p14:creationId xmlns:p14="http://schemas.microsoft.com/office/powerpoint/2010/main" val="2333710554"/>
+        <p14:creationId xmlns:p14="http://schemas.microsoft.com/office/powerpoint/2010/main" val="265129202"/>
       </p:ext>
     </p:extLst>
   </p:cSld>
@@ -18480,65 +18462,79 @@
           <a:p>
             <a:r>
               <a:rPr lang="en-US" dirty="0"/>
-              <a:t>The Pester Book</a:t>
-            </a:r>
-          </a:p>
-        </p:txBody>
-      </p:sp>
-      <p:pic>
-        <p:nvPicPr>
-          <p:cNvPr id="1026" name="Picture 2" descr="The Pester Book">
-            <a:hlinkClick r:id="rId3"/>
-            <a:extLst>
-              <a:ext uri="{FF2B5EF4-FFF2-40B4-BE49-F238E27FC236}">
-                <a16:creationId xmlns:a16="http://schemas.microsoft.com/office/drawing/2014/main" id="{356CEACA-38F7-4E28-A055-5BA2F89F62BB}"/>
-              </a:ext>
-            </a:extLst>
-          </p:cNvPr>
-          <p:cNvPicPr>
-            <a:picLocks noGrp="1" noChangeAspect="1" noChangeArrowheads="1"/>
-          </p:cNvPicPr>
+              <a:t>Unit and Acceptance Testing</a:t>
+            </a:r>
+          </a:p>
+        </p:txBody>
+      </p:sp>
+      <p:sp>
+        <p:nvSpPr>
+          <p:cNvPr id="3" name="Content Placeholder 2"/>
+          <p:cNvSpPr>
+            <a:spLocks noGrp="1"/>
+          </p:cNvSpPr>
           <p:nvPr>
             <p:ph idx="1"/>
           </p:nvPr>
-        </p:nvPicPr>
-        <p:blipFill>
-          <a:blip r:embed="rId4">
-            <a:extLst>
-              <a:ext uri="{28A0092B-C50C-407E-A947-70E740481C1C}">
-                <a14:useLocalDpi xmlns:a14="http://schemas.microsoft.com/office/drawing/2010/main" val="0"/>
-              </a:ext>
-            </a:extLst>
-          </a:blip>
-          <a:srcRect/>
-          <a:stretch>
-            <a:fillRect/>
-          </a:stretch>
-        </p:blipFill>
-        <p:spPr bwMode="auto">
-          <a:xfrm>
-            <a:off x="4294649" y="1257300"/>
-            <a:ext cx="3602701" cy="4800600"/>
-          </a:xfrm>
-          <a:prstGeom prst="rect">
-            <a:avLst/>
-          </a:prstGeom>
-          <a:noFill/>
-          <a:extLst>
-            <a:ext uri="{909E8E84-426E-40DD-AFC4-6F175D3DCCD1}">
-              <a14:hiddenFill xmlns:a14="http://schemas.microsoft.com/office/drawing/2010/main">
-                <a:solidFill>
-                  <a:srgbClr val="FFFFFF"/>
-                </a:solidFill>
-              </a14:hiddenFill>
-            </a:ext>
-          </a:extLst>
-        </p:spPr>
-      </p:pic>
+        </p:nvSpPr>
+        <p:spPr/>
+        <p:txBody>
+          <a:bodyPr/>
+          <a:lstStyle/>
+          <a:p>
+            <a:r>
+              <a:rPr lang="en-US" dirty="0"/>
+              <a:t>Testing the simplest most granular logic of your code.  i.e. A Unit</a:t>
+            </a:r>
+          </a:p>
+          <a:p>
+            <a:endParaRPr lang="en-US" dirty="0"/>
+          </a:p>
+          <a:p>
+            <a:r>
+              <a:rPr lang="en-US" dirty="0"/>
+              <a:t>What is a Unit?</a:t>
+            </a:r>
+          </a:p>
+          <a:p>
+            <a:pPr lvl="1"/>
+            <a:r>
+              <a:rPr lang="en-US" dirty="0"/>
+              <a:t>The smallest testable part of an application</a:t>
+            </a:r>
+          </a:p>
+          <a:p>
+            <a:pPr lvl="2"/>
+            <a:r>
+              <a:rPr lang="en-US" dirty="0"/>
+              <a:t>Class, Method, Function</a:t>
+            </a:r>
+          </a:p>
+          <a:p>
+            <a:pPr lvl="2"/>
+            <a:r>
+              <a:rPr lang="en-US" dirty="0"/>
+              <a:t>Logic Branches</a:t>
+            </a:r>
+          </a:p>
+          <a:p>
+            <a:pPr marL="0" indent="0">
+              <a:buNone/>
+            </a:pPr>
+            <a:endParaRPr lang="en-US" dirty="0"/>
+          </a:p>
+          <a:p>
+            <a:r>
+              <a:rPr lang="en-US" dirty="0"/>
+              <a:t>Acceptance Testing: Given these inputs I expect my code to execute as such and have this output.</a:t>
+            </a:r>
+          </a:p>
+        </p:txBody>
+      </p:sp>
     </p:spTree>
     <p:extLst>
       <p:ext uri="{BB962C8B-B14F-4D97-AF65-F5344CB8AC3E}">
-        <p14:creationId xmlns:p14="http://schemas.microsoft.com/office/powerpoint/2010/main" val="265129202"/>
+        <p14:creationId xmlns:p14="http://schemas.microsoft.com/office/powerpoint/2010/main" val="2638750112"/>
       </p:ext>
     </p:extLst>
   </p:cSld>
@@ -18582,7 +18578,7 @@
           <a:p>
             <a:r>
               <a:rPr lang="en-US" dirty="0"/>
-              <a:t>Unit Testing</a:t>
+              <a:t>Unit Testing Clarifications</a:t>
             </a:r>
           </a:p>
         </p:txBody>
@@ -18604,7 +18600,7 @@
           <a:p>
             <a:r>
               <a:rPr lang="en-US" dirty="0"/>
-              <a:t>Testing the simplest most granular logic of your code.  i.e. A Unit</a:t>
+              <a:t>This is not testing functionality!</a:t>
             </a:r>
           </a:p>
           <a:p>
@@ -18613,28 +18609,16 @@
           <a:p>
             <a:r>
               <a:rPr lang="en-US" dirty="0"/>
-              <a:t>What is a Unit?</a:t>
-            </a:r>
-          </a:p>
-          <a:p>
-            <a:pPr lvl="1"/>
-            <a:r>
-              <a:rPr lang="en-US" dirty="0"/>
-              <a:t>The smallest testable part of an application</a:t>
-            </a:r>
-          </a:p>
-          <a:p>
-            <a:pPr lvl="2"/>
-            <a:r>
-              <a:rPr lang="en-US" dirty="0"/>
-              <a:t>Class, Method, Function</a:t>
-            </a:r>
-          </a:p>
-          <a:p>
-            <a:pPr lvl="2"/>
-            <a:r>
-              <a:rPr lang="en-US" dirty="0"/>
-              <a:t>Logic Branches</a:t>
+              <a:t>Unit testing is not easy (at first)</a:t>
+            </a:r>
+          </a:p>
+          <a:p>
+            <a:endParaRPr lang="en-US" dirty="0"/>
+          </a:p>
+          <a:p>
+            <a:r>
+              <a:rPr lang="en-US" dirty="0"/>
+              <a:t>Some code is hard to test. </a:t>
             </a:r>
           </a:p>
           <a:p>
@@ -18643,18 +18627,12 @@
             </a:pPr>
             <a:endParaRPr lang="en-US" dirty="0"/>
           </a:p>
-          <a:p>
-            <a:r>
-              <a:rPr lang="en-US" dirty="0"/>
-              <a:t>Given these inputs I expect my code to execute as such and have this output.</a:t>
-            </a:r>
-          </a:p>
         </p:txBody>
       </p:sp>
     </p:spTree>
     <p:extLst>
       <p:ext uri="{BB962C8B-B14F-4D97-AF65-F5344CB8AC3E}">
-        <p14:creationId xmlns:p14="http://schemas.microsoft.com/office/powerpoint/2010/main" val="2638750112"/>
+        <p14:creationId xmlns:p14="http://schemas.microsoft.com/office/powerpoint/2010/main" val="1454269918"/>
       </p:ext>
     </p:extLst>
   </p:cSld>
@@ -18698,7 +18676,7 @@
           <a:p>
             <a:r>
               <a:rPr lang="en-US" dirty="0"/>
-              <a:t>Unit Testing Clarifications</a:t>
+              <a:t>Unit VS Integration Testing</a:t>
             </a:r>
           </a:p>
         </p:txBody>
@@ -18720,7 +18698,15 @@
           <a:p>
             <a:r>
               <a:rPr lang="en-US" dirty="0"/>
-              <a:t>This is not testing functionality!</a:t>
+              <a:t>Integration testing depends on external sources. (Databases, Services, </a:t>
+            </a:r>
+            <a:r>
+              <a:rPr lang="en-US" dirty="0" err="1"/>
+              <a:t>etc</a:t>
+            </a:r>
+            <a:r>
+              <a:rPr lang="en-US" dirty="0"/>
+              <a:t>)</a:t>
             </a:r>
           </a:p>
           <a:p>
@@ -18729,7 +18715,7 @@
           <a:p>
             <a:r>
               <a:rPr lang="en-US" dirty="0"/>
-              <a:t>Unit testing is not easy (at first)</a:t>
+              <a:t>Integration testing tests the entire application.</a:t>
             </a:r>
           </a:p>
           <a:p>
@@ -18738,7 +18724,16 @@
           <a:p>
             <a:r>
               <a:rPr lang="en-US" dirty="0"/>
-              <a:t>Some code is hard to test. </a:t>
+              <a:t>Unit testing tests the logic of the functions, modules, methods.</a:t>
+            </a:r>
+          </a:p>
+          <a:p>
+            <a:endParaRPr lang="en-US" dirty="0"/>
+          </a:p>
+          <a:p>
+            <a:r>
+              <a:rPr lang="en-US" dirty="0"/>
+              <a:t>Have basic Unit testing practices mastered before tackling integration testing.</a:t>
             </a:r>
           </a:p>
           <a:p>
@@ -18752,7 +18747,7 @@
     </p:spTree>
     <p:extLst>
       <p:ext uri="{BB962C8B-B14F-4D97-AF65-F5344CB8AC3E}">
-        <p14:creationId xmlns:p14="http://schemas.microsoft.com/office/powerpoint/2010/main" val="1454269918"/>
+        <p14:creationId xmlns:p14="http://schemas.microsoft.com/office/powerpoint/2010/main" val="340555750"/>
       </p:ext>
     </p:extLst>
   </p:cSld>
@@ -18796,7 +18791,7 @@
           <a:p>
             <a:r>
               <a:rPr lang="en-US" dirty="0"/>
-              <a:t>Unit VS Integration Testing</a:t>
+              <a:t>Why Unit Test?</a:t>
             </a:r>
           </a:p>
         </p:txBody>
@@ -18818,15 +18813,7 @@
           <a:p>
             <a:r>
               <a:rPr lang="en-US" dirty="0"/>
-              <a:t>Integration testing depends on external sources. (Databases, Services, </a:t>
-            </a:r>
-            <a:r>
-              <a:rPr lang="en-US" dirty="0" err="1"/>
-              <a:t>etc</a:t>
-            </a:r>
-            <a:r>
-              <a:rPr lang="en-US" dirty="0"/>
-              <a:t>)</a:t>
+              <a:t>You will find bugs in your code.</a:t>
             </a:r>
           </a:p>
           <a:p>
@@ -18835,7 +18822,7 @@
           <a:p>
             <a:r>
               <a:rPr lang="en-US" dirty="0"/>
-              <a:t>Integration testing tests the entire application.</a:t>
+              <a:t>It is the only way to self peer review your code.</a:t>
             </a:r>
           </a:p>
           <a:p>
@@ -18844,17 +18831,34 @@
           <a:p>
             <a:r>
               <a:rPr lang="en-US" dirty="0"/>
-              <a:t>Unit testing tests the logic of the functions, modules, methods.</a:t>
+              <a:t>It separates you from the pack.</a:t>
             </a:r>
           </a:p>
           <a:p>
             <a:endParaRPr lang="en-US" dirty="0"/>
           </a:p>
           <a:p>
-            <a:r>
-              <a:rPr lang="en-US" dirty="0"/>
-              <a:t>Have basic Unit testing practices mastered before tackling integration testing.</a:t>
-            </a:r>
+            <a:pPr marL="0" indent="0">
+              <a:buNone/>
+            </a:pPr>
+            <a:endParaRPr lang="en-US" dirty="0">
+              <a:hlinkClick r:id="rId3"/>
+            </a:endParaRPr>
+          </a:p>
+          <a:p>
+            <a:pPr marL="0" indent="0">
+              <a:buNone/>
+            </a:pPr>
+            <a:r>
+              <a:rPr lang="en-US" dirty="0">
+                <a:hlinkClick r:id="rId3"/>
+              </a:rPr>
+              <a:t>http://blog.celerity.com/the-true-cost-of-a-software-bug</a:t>
+            </a:r>
+            <a:endParaRPr lang="en-US" dirty="0"/>
+          </a:p>
+          <a:p>
+            <a:endParaRPr lang="en-US" dirty="0"/>
           </a:p>
           <a:p>
             <a:pPr marL="0" indent="0">
@@ -18867,7 +18871,7 @@
     </p:spTree>
     <p:extLst>
       <p:ext uri="{BB962C8B-B14F-4D97-AF65-F5344CB8AC3E}">
-        <p14:creationId xmlns:p14="http://schemas.microsoft.com/office/powerpoint/2010/main" val="340555750"/>
+        <p14:creationId xmlns:p14="http://schemas.microsoft.com/office/powerpoint/2010/main" val="2845285745"/>
       </p:ext>
     </p:extLst>
   </p:cSld>
@@ -19387,6 +19391,12 @@
 </file>
 
 <file path=customXml/item1.xml><?xml version="1.0" encoding="utf-8"?>
+<p:properties xmlns:p="http://schemas.microsoft.com/office/2006/metadata/properties" xmlns:xsi="http://www.w3.org/2001/XMLSchema-instance" xmlns:pc="http://schemas.microsoft.com/office/infopath/2007/PartnerControls">
+  <documentManagement/>
+</p:properties>
+</file>
+
+<file path=customXml/item2.xml><?xml version="1.0" encoding="utf-8"?>
 <ct:contentTypeSchema xmlns:ct="http://schemas.microsoft.com/office/2006/metadata/contentType" xmlns:ma="http://schemas.microsoft.com/office/2006/metadata/properties/metaAttributes" ct:_="" ma:_="" ma:contentTypeName="Document" ma:contentTypeID="0x010100CFD7474EC5F9804A8C0915A0D2B3E72B" ma:contentTypeVersion="6" ma:contentTypeDescription="Create a new document." ma:contentTypeScope="" ma:versionID="1e506071d132a47b68c5589909b09f0e">
   <xsd:schema xmlns:xsd="http://www.w3.org/2001/XMLSchema" xmlns:xs="http://www.w3.org/2001/XMLSchema" xmlns:p="http://schemas.microsoft.com/office/2006/metadata/properties" xmlns:ns2="437d3976-146d-487e-9b32-45ade7cdb3c3" xmlns:ns3="ba924082-f255-4689-bc14-7c311a17681c" targetNamespace="http://schemas.microsoft.com/office/2006/metadata/properties" ma:root="true" ma:fieldsID="d9451a99ae5dfcf301f63b02ef9f83d5" ns2:_="" ns3:_="">
     <xsd:import namespace="437d3976-146d-487e-9b32-45ade7cdb3c3"/>
@@ -19565,12 +19575,6 @@
 </ct:contentTypeSchema>
 </file>
 
-<file path=customXml/item2.xml><?xml version="1.0" encoding="utf-8"?>
-<p:properties xmlns:p="http://schemas.microsoft.com/office/2006/metadata/properties" xmlns:xsi="http://www.w3.org/2001/XMLSchema-instance" xmlns:pc="http://schemas.microsoft.com/office/infopath/2007/PartnerControls">
-  <documentManagement/>
-</p:properties>
-</file>
-
 <file path=customXml/item3.xml><?xml version="1.0" encoding="utf-8"?>
 <?mso-contentType ?>
 <FormTemplates xmlns="http://schemas.microsoft.com/sharepoint/v3/contenttype/forms">
@@ -19581,6 +19585,23 @@
 </file>
 
 <file path=customXml/itemProps1.xml><?xml version="1.0" encoding="utf-8"?>
+<ds:datastoreItem xmlns:ds="http://schemas.openxmlformats.org/officeDocument/2006/customXml" ds:itemID="{AFF96CB3-579C-4369-8AB2-D91B353AC245}">
+  <ds:schemaRefs>
+    <ds:schemaRef ds:uri="http://purl.org/dc/terms/"/>
+    <ds:schemaRef ds:uri="http://schemas.microsoft.com/office/infopath/2007/PartnerControls"/>
+    <ds:schemaRef ds:uri="http://purl.org/dc/dcmitype/"/>
+    <ds:schemaRef ds:uri="http://schemas.microsoft.com/office/2006/documentManagement/types"/>
+    <ds:schemaRef ds:uri="437d3976-146d-487e-9b32-45ade7cdb3c3"/>
+    <ds:schemaRef ds:uri="http://purl.org/dc/elements/1.1/"/>
+    <ds:schemaRef ds:uri="http://schemas.microsoft.com/office/2006/metadata/properties"/>
+    <ds:schemaRef ds:uri="ba924082-f255-4689-bc14-7c311a17681c"/>
+    <ds:schemaRef ds:uri="http://schemas.openxmlformats.org/package/2006/metadata/core-properties"/>
+    <ds:schemaRef ds:uri="http://www.w3.org/XML/1998/namespace"/>
+  </ds:schemaRefs>
+</ds:datastoreItem>
+</file>
+
+<file path=customXml/itemProps2.xml><?xml version="1.0" encoding="utf-8"?>
 <ds:datastoreItem xmlns:ds="http://schemas.openxmlformats.org/officeDocument/2006/customXml" ds:itemID="{1881FD18-C877-47D9-A9C8-9B9EB7A5D424}">
   <ds:schemaRefs>
     <ds:schemaRef ds:uri="http://schemas.microsoft.com/office/2006/metadata/contentType"/>
@@ -19599,23 +19620,6 @@
 </ds:datastoreItem>
 </file>
 
-<file path=customXml/itemProps2.xml><?xml version="1.0" encoding="utf-8"?>
-<ds:datastoreItem xmlns:ds="http://schemas.openxmlformats.org/officeDocument/2006/customXml" ds:itemID="{AFF96CB3-579C-4369-8AB2-D91B353AC245}">
-  <ds:schemaRefs>
-    <ds:schemaRef ds:uri="http://purl.org/dc/terms/"/>
-    <ds:schemaRef ds:uri="http://schemas.microsoft.com/office/infopath/2007/PartnerControls"/>
-    <ds:schemaRef ds:uri="http://purl.org/dc/dcmitype/"/>
-    <ds:schemaRef ds:uri="http://schemas.microsoft.com/office/2006/documentManagement/types"/>
-    <ds:schemaRef ds:uri="437d3976-146d-487e-9b32-45ade7cdb3c3"/>
-    <ds:schemaRef ds:uri="http://purl.org/dc/elements/1.1/"/>
-    <ds:schemaRef ds:uri="http://schemas.microsoft.com/office/2006/metadata/properties"/>
-    <ds:schemaRef ds:uri="ba924082-f255-4689-bc14-7c311a17681c"/>
-    <ds:schemaRef ds:uri="http://schemas.openxmlformats.org/package/2006/metadata/core-properties"/>
-    <ds:schemaRef ds:uri="http://www.w3.org/XML/1998/namespace"/>
-  </ds:schemaRefs>
-</ds:datastoreItem>
-</file>
-
 <file path=customXml/itemProps3.xml><?xml version="1.0" encoding="utf-8"?>
 <ds:datastoreItem xmlns:ds="http://schemas.openxmlformats.org/officeDocument/2006/customXml" ds:itemID="{8F9099B0-B9E3-45A6-848D-7EA25626C078}">
   <ds:schemaRefs>

</xml_diff>